<commit_message>
Updated seminar materials for errors and debugging
</commit_message>
<xml_diff>
--- a/Week_13_Consolidation_3_and_Errors/Seminar_6_errors_and_debugging/Errors and Debugging.pptx
+++ b/Week_13_Consolidation_3_and_Errors/Seminar_6_errors_and_debugging/Errors and Debugging.pptx
@@ -23,7 +23,11 @@
     <p:sldId id="316" r:id="rId17"/>
     <p:sldId id="319" r:id="rId18"/>
     <p:sldId id="317" r:id="rId19"/>
-    <p:sldId id="320" r:id="rId20"/>
+    <p:sldId id="322" r:id="rId20"/>
+    <p:sldId id="270" r:id="rId21"/>
+    <p:sldId id="323" r:id="rId22"/>
+    <p:sldId id="324" r:id="rId23"/>
+    <p:sldId id="320" r:id="rId24"/>
   </p:sldIdLst>
   <p:sldSz cx="12192000" cy="6858000"/>
   <p:notesSz cx="6858000" cy="9144000"/>
@@ -130,6 +134,277 @@
 </p:presentation>
 </file>
 
+<file path=ppt/revisionInfo.xml><?xml version="1.0" encoding="utf-8"?>
+<p1510:revInfo xmlns:a="http://schemas.openxmlformats.org/drawingml/2006/main" xmlns:r="http://schemas.openxmlformats.org/officeDocument/2006/relationships" xmlns:p1510="http://schemas.microsoft.com/office/powerpoint/2015/10/main">
+  <p1510:revLst>
+    <p1510:client id="{1D848F38-111C-F544-81E6-B8095E5A0A3D}" v="7" dt="2026-01-29T12:27:33.906"/>
+  </p1510:revLst>
+</p1510:revInfo>
+</file>
+
+<file path=ppt/changesInfos/changesInfo1.xml><?xml version="1.0" encoding="utf-8"?>
+<pc:chgInfo xmlns:a="http://schemas.openxmlformats.org/drawingml/2006/main" xmlns:r="http://schemas.openxmlformats.org/officeDocument/2006/relationships" xmlns:ac="http://schemas.microsoft.com/office/drawing/2013/main/command" xmlns:pc="http://schemas.microsoft.com/office/powerpoint/2013/main/command">
+  <pc:docChgLst>
+    <pc:chgData name="Martin Garrad" userId="29fa8137-b5d4-4adf-94e3-55aca812c4da" providerId="ADAL" clId="{FE7E3326-2F4E-5A39-AD8A-48BAAAFC5A20}"/>
+    <pc:docChg chg="undo custSel addSld modSld sldOrd">
+      <pc:chgData name="Martin Garrad" userId="29fa8137-b5d4-4adf-94e3-55aca812c4da" providerId="ADAL" clId="{FE7E3326-2F4E-5A39-AD8A-48BAAAFC5A20}" dt="2026-01-29T12:55:40.528" v="574" actId="27636"/>
+      <pc:docMkLst>
+        <pc:docMk/>
+      </pc:docMkLst>
+      <pc:sldChg chg="modSp mod">
+        <pc:chgData name="Martin Garrad" userId="29fa8137-b5d4-4adf-94e3-55aca812c4da" providerId="ADAL" clId="{FE7E3326-2F4E-5A39-AD8A-48BAAAFC5A20}" dt="2026-01-29T12:55:40.528" v="574" actId="27636"/>
+        <pc:sldMkLst>
+          <pc:docMk/>
+          <pc:sldMk cId="1640977870" sldId="257"/>
+        </pc:sldMkLst>
+        <pc:spChg chg="mod">
+          <ac:chgData name="Martin Garrad" userId="29fa8137-b5d4-4adf-94e3-55aca812c4da" providerId="ADAL" clId="{FE7E3326-2F4E-5A39-AD8A-48BAAAFC5A20}" dt="2026-01-29T12:55:40.528" v="574" actId="27636"/>
+          <ac:spMkLst>
+            <pc:docMk/>
+            <pc:sldMk cId="1640977870" sldId="257"/>
+            <ac:spMk id="2" creationId="{0DA001E2-C0C1-A454-A916-7022B80045D4}"/>
+          </ac:spMkLst>
+        </pc:spChg>
+      </pc:sldChg>
+      <pc:sldChg chg="modSp add mod">
+        <pc:chgData name="Martin Garrad" userId="29fa8137-b5d4-4adf-94e3-55aca812c4da" providerId="ADAL" clId="{FE7E3326-2F4E-5A39-AD8A-48BAAAFC5A20}" dt="2026-01-29T12:23:14.423" v="498" actId="1076"/>
+        <pc:sldMkLst>
+          <pc:docMk/>
+          <pc:sldMk cId="3779832221" sldId="270"/>
+        </pc:sldMkLst>
+        <pc:picChg chg="mod">
+          <ac:chgData name="Martin Garrad" userId="29fa8137-b5d4-4adf-94e3-55aca812c4da" providerId="ADAL" clId="{FE7E3326-2F4E-5A39-AD8A-48BAAAFC5A20}" dt="2026-01-29T12:23:14.423" v="498" actId="1076"/>
+          <ac:picMkLst>
+            <pc:docMk/>
+            <pc:sldMk cId="3779832221" sldId="270"/>
+            <ac:picMk id="3" creationId="{2C903E62-6DF0-CF38-FE88-A8B3AC180089}"/>
+          </ac:picMkLst>
+        </pc:picChg>
+      </pc:sldChg>
+      <pc:sldChg chg="delSp modSp">
+        <pc:chgData name="Martin Garrad" userId="29fa8137-b5d4-4adf-94e3-55aca812c4da" providerId="ADAL" clId="{FE7E3326-2F4E-5A39-AD8A-48BAAAFC5A20}" dt="2026-01-29T12:26:55.093" v="534" actId="165"/>
+        <pc:sldMkLst>
+          <pc:docMk/>
+          <pc:sldMk cId="4079430356" sldId="316"/>
+        </pc:sldMkLst>
+        <pc:spChg chg="mod topLvl">
+          <ac:chgData name="Martin Garrad" userId="29fa8137-b5d4-4adf-94e3-55aca812c4da" providerId="ADAL" clId="{FE7E3326-2F4E-5A39-AD8A-48BAAAFC5A20}" dt="2026-01-29T12:26:55.093" v="534" actId="165"/>
+          <ac:spMkLst>
+            <pc:docMk/>
+            <pc:sldMk cId="4079430356" sldId="316"/>
+            <ac:spMk id="4" creationId="{9098035E-25FB-14A8-140C-9C380F0235A9}"/>
+          </ac:spMkLst>
+        </pc:spChg>
+        <pc:spChg chg="mod topLvl">
+          <ac:chgData name="Martin Garrad" userId="29fa8137-b5d4-4adf-94e3-55aca812c4da" providerId="ADAL" clId="{FE7E3326-2F4E-5A39-AD8A-48BAAAFC5A20}" dt="2026-01-29T12:26:55.093" v="534" actId="165"/>
+          <ac:spMkLst>
+            <pc:docMk/>
+            <pc:sldMk cId="4079430356" sldId="316"/>
+            <ac:spMk id="6" creationId="{99275E9E-455D-20AD-EDEE-ABE50C1F64F0}"/>
+          </ac:spMkLst>
+        </pc:spChg>
+        <pc:spChg chg="mod topLvl">
+          <ac:chgData name="Martin Garrad" userId="29fa8137-b5d4-4adf-94e3-55aca812c4da" providerId="ADAL" clId="{FE7E3326-2F4E-5A39-AD8A-48BAAAFC5A20}" dt="2026-01-29T12:26:55.093" v="534" actId="165"/>
+          <ac:spMkLst>
+            <pc:docMk/>
+            <pc:sldMk cId="4079430356" sldId="316"/>
+            <ac:spMk id="7" creationId="{86926D97-EE7A-A3A6-442E-54BFFD576D59}"/>
+          </ac:spMkLst>
+        </pc:spChg>
+        <pc:spChg chg="mod topLvl">
+          <ac:chgData name="Martin Garrad" userId="29fa8137-b5d4-4adf-94e3-55aca812c4da" providerId="ADAL" clId="{FE7E3326-2F4E-5A39-AD8A-48BAAAFC5A20}" dt="2026-01-29T12:26:55.093" v="534" actId="165"/>
+          <ac:spMkLst>
+            <pc:docMk/>
+            <pc:sldMk cId="4079430356" sldId="316"/>
+            <ac:spMk id="8" creationId="{B2EEA638-BA77-1BE3-2C92-9A33495FB7E4}"/>
+          </ac:spMkLst>
+        </pc:spChg>
+        <pc:spChg chg="mod topLvl">
+          <ac:chgData name="Martin Garrad" userId="29fa8137-b5d4-4adf-94e3-55aca812c4da" providerId="ADAL" clId="{FE7E3326-2F4E-5A39-AD8A-48BAAAFC5A20}" dt="2026-01-29T12:26:55.093" v="534" actId="165"/>
+          <ac:spMkLst>
+            <pc:docMk/>
+            <pc:sldMk cId="4079430356" sldId="316"/>
+            <ac:spMk id="9" creationId="{B9452BB6-2745-9BF1-D0B0-86981AD9B7E8}"/>
+          </ac:spMkLst>
+        </pc:spChg>
+        <pc:spChg chg="mod topLvl">
+          <ac:chgData name="Martin Garrad" userId="29fa8137-b5d4-4adf-94e3-55aca812c4da" providerId="ADAL" clId="{FE7E3326-2F4E-5A39-AD8A-48BAAAFC5A20}" dt="2026-01-29T12:26:55.093" v="534" actId="165"/>
+          <ac:spMkLst>
+            <pc:docMk/>
+            <pc:sldMk cId="4079430356" sldId="316"/>
+            <ac:spMk id="10" creationId="{9BC05C64-4E90-EE8D-ACAB-C29102DDD8C7}"/>
+          </ac:spMkLst>
+        </pc:spChg>
+        <pc:spChg chg="mod topLvl">
+          <ac:chgData name="Martin Garrad" userId="29fa8137-b5d4-4adf-94e3-55aca812c4da" providerId="ADAL" clId="{FE7E3326-2F4E-5A39-AD8A-48BAAAFC5A20}" dt="2026-01-29T12:26:55.093" v="534" actId="165"/>
+          <ac:spMkLst>
+            <pc:docMk/>
+            <pc:sldMk cId="4079430356" sldId="316"/>
+            <ac:spMk id="11" creationId="{31105044-9D09-3C56-850D-25A5D49A6A34}"/>
+          </ac:spMkLst>
+        </pc:spChg>
+        <pc:spChg chg="mod topLvl">
+          <ac:chgData name="Martin Garrad" userId="29fa8137-b5d4-4adf-94e3-55aca812c4da" providerId="ADAL" clId="{FE7E3326-2F4E-5A39-AD8A-48BAAAFC5A20}" dt="2026-01-29T12:26:55.093" v="534" actId="165"/>
+          <ac:spMkLst>
+            <pc:docMk/>
+            <pc:sldMk cId="4079430356" sldId="316"/>
+            <ac:spMk id="12" creationId="{855B058E-9446-4CCD-AE87-FCB9822D919C}"/>
+          </ac:spMkLst>
+        </pc:spChg>
+        <pc:spChg chg="mod topLvl">
+          <ac:chgData name="Martin Garrad" userId="29fa8137-b5d4-4adf-94e3-55aca812c4da" providerId="ADAL" clId="{FE7E3326-2F4E-5A39-AD8A-48BAAAFC5A20}" dt="2026-01-29T12:26:55.093" v="534" actId="165"/>
+          <ac:spMkLst>
+            <pc:docMk/>
+            <pc:sldMk cId="4079430356" sldId="316"/>
+            <ac:spMk id="13" creationId="{DB708F05-7868-ECDE-51ED-E69E1E145536}"/>
+          </ac:spMkLst>
+        </pc:spChg>
+        <pc:spChg chg="mod topLvl">
+          <ac:chgData name="Martin Garrad" userId="29fa8137-b5d4-4adf-94e3-55aca812c4da" providerId="ADAL" clId="{FE7E3326-2F4E-5A39-AD8A-48BAAAFC5A20}" dt="2026-01-29T12:26:55.093" v="534" actId="165"/>
+          <ac:spMkLst>
+            <pc:docMk/>
+            <pc:sldMk cId="4079430356" sldId="316"/>
+            <ac:spMk id="15" creationId="{6EAB0810-A409-F56F-6F9E-BD05C05287E4}"/>
+          </ac:spMkLst>
+        </pc:spChg>
+      </pc:sldChg>
+      <pc:sldChg chg="modSp mod">
+        <pc:chgData name="Martin Garrad" userId="29fa8137-b5d4-4adf-94e3-55aca812c4da" providerId="ADAL" clId="{FE7E3326-2F4E-5A39-AD8A-48BAAAFC5A20}" dt="2026-01-29T12:29:37.965" v="550" actId="20577"/>
+        <pc:sldMkLst>
+          <pc:docMk/>
+          <pc:sldMk cId="3130747973" sldId="320"/>
+        </pc:sldMkLst>
+        <pc:spChg chg="mod">
+          <ac:chgData name="Martin Garrad" userId="29fa8137-b5d4-4adf-94e3-55aca812c4da" providerId="ADAL" clId="{FE7E3326-2F4E-5A39-AD8A-48BAAAFC5A20}" dt="2026-01-29T12:29:37.965" v="550" actId="20577"/>
+          <ac:spMkLst>
+            <pc:docMk/>
+            <pc:sldMk cId="3130747973" sldId="320"/>
+            <ac:spMk id="3" creationId="{EB3792AD-2997-3536-D3D6-4685638A51E4}"/>
+          </ac:spMkLst>
+        </pc:spChg>
+      </pc:sldChg>
+      <pc:sldChg chg="modSp new mod ord">
+        <pc:chgData name="Martin Garrad" userId="29fa8137-b5d4-4adf-94e3-55aca812c4da" providerId="ADAL" clId="{FE7E3326-2F4E-5A39-AD8A-48BAAAFC5A20}" dt="2026-01-29T12:21:49.374" v="496" actId="20578"/>
+        <pc:sldMkLst>
+          <pc:docMk/>
+          <pc:sldMk cId="1206721504" sldId="322"/>
+        </pc:sldMkLst>
+        <pc:spChg chg="mod">
+          <ac:chgData name="Martin Garrad" userId="29fa8137-b5d4-4adf-94e3-55aca812c4da" providerId="ADAL" clId="{FE7E3326-2F4E-5A39-AD8A-48BAAAFC5A20}" dt="2026-01-29T12:19:21.065" v="284" actId="20577"/>
+          <ac:spMkLst>
+            <pc:docMk/>
+            <pc:sldMk cId="1206721504" sldId="322"/>
+            <ac:spMk id="2" creationId="{BE17C1A8-DBAE-F97D-1742-6D79714A93E6}"/>
+          </ac:spMkLst>
+        </pc:spChg>
+        <pc:spChg chg="mod">
+          <ac:chgData name="Martin Garrad" userId="29fa8137-b5d4-4adf-94e3-55aca812c4da" providerId="ADAL" clId="{FE7E3326-2F4E-5A39-AD8A-48BAAAFC5A20}" dt="2026-01-29T12:20:07.495" v="495" actId="20577"/>
+          <ac:spMkLst>
+            <pc:docMk/>
+            <pc:sldMk cId="1206721504" sldId="322"/>
+            <ac:spMk id="3" creationId="{9E1766B1-4E96-71D1-9237-603EEC007D6A}"/>
+          </ac:spMkLst>
+        </pc:spChg>
+      </pc:sldChg>
+      <pc:sldChg chg="addSp delSp modSp add mod">
+        <pc:chgData name="Martin Garrad" userId="29fa8137-b5d4-4adf-94e3-55aca812c4da" providerId="ADAL" clId="{FE7E3326-2F4E-5A39-AD8A-48BAAAFC5A20}" dt="2026-01-29T12:26:05.583" v="529" actId="1076"/>
+        <pc:sldMkLst>
+          <pc:docMk/>
+          <pc:sldMk cId="666266812" sldId="323"/>
+        </pc:sldMkLst>
+        <pc:spChg chg="mod">
+          <ac:chgData name="Martin Garrad" userId="29fa8137-b5d4-4adf-94e3-55aca812c4da" providerId="ADAL" clId="{FE7E3326-2F4E-5A39-AD8A-48BAAAFC5A20}" dt="2026-01-29T12:23:24.511" v="513" actId="20577"/>
+          <ac:spMkLst>
+            <pc:docMk/>
+            <pc:sldMk cId="666266812" sldId="323"/>
+            <ac:spMk id="2" creationId="{0CCCB31E-7463-4B3E-CBA4-E8CFF2D7E0F6}"/>
+          </ac:spMkLst>
+        </pc:spChg>
+        <pc:spChg chg="add del mod">
+          <ac:chgData name="Martin Garrad" userId="29fa8137-b5d4-4adf-94e3-55aca812c4da" providerId="ADAL" clId="{FE7E3326-2F4E-5A39-AD8A-48BAAAFC5A20}" dt="2026-01-29T12:23:32.915" v="515" actId="478"/>
+          <ac:spMkLst>
+            <pc:docMk/>
+            <pc:sldMk cId="666266812" sldId="323"/>
+            <ac:spMk id="6" creationId="{70B003FB-D031-6D84-CD9F-B49F5F51686A}"/>
+          </ac:spMkLst>
+        </pc:spChg>
+        <pc:picChg chg="del">
+          <ac:chgData name="Martin Garrad" userId="29fa8137-b5d4-4adf-94e3-55aca812c4da" providerId="ADAL" clId="{FE7E3326-2F4E-5A39-AD8A-48BAAAFC5A20}" dt="2026-01-29T12:23:33.681" v="516" actId="478"/>
+          <ac:picMkLst>
+            <pc:docMk/>
+            <pc:sldMk cId="666266812" sldId="323"/>
+            <ac:picMk id="3" creationId="{D83B65D8-C84D-737E-610A-A3053AE72759}"/>
+          </ac:picMkLst>
+        </pc:picChg>
+        <pc:picChg chg="del">
+          <ac:chgData name="Martin Garrad" userId="29fa8137-b5d4-4adf-94e3-55aca812c4da" providerId="ADAL" clId="{FE7E3326-2F4E-5A39-AD8A-48BAAAFC5A20}" dt="2026-01-29T12:23:27.527" v="514" actId="478"/>
+          <ac:picMkLst>
+            <pc:docMk/>
+            <pc:sldMk cId="666266812" sldId="323"/>
+            <ac:picMk id="4" creationId="{C2196381-A2E3-1529-A0F6-DF0E284D8391}"/>
+          </ac:picMkLst>
+        </pc:picChg>
+        <pc:picChg chg="add mod">
+          <ac:chgData name="Martin Garrad" userId="29fa8137-b5d4-4adf-94e3-55aca812c4da" providerId="ADAL" clId="{FE7E3326-2F4E-5A39-AD8A-48BAAAFC5A20}" dt="2026-01-29T12:26:05.583" v="529" actId="1076"/>
+          <ac:picMkLst>
+            <pc:docMk/>
+            <pc:sldMk cId="666266812" sldId="323"/>
+            <ac:picMk id="8" creationId="{853CAB5E-DE28-BF09-0B0E-D88947A5960C}"/>
+          </ac:picMkLst>
+        </pc:picChg>
+        <pc:picChg chg="add mod">
+          <ac:chgData name="Martin Garrad" userId="29fa8137-b5d4-4adf-94e3-55aca812c4da" providerId="ADAL" clId="{FE7E3326-2F4E-5A39-AD8A-48BAAAFC5A20}" dt="2026-01-29T12:26:03.609" v="528" actId="1076"/>
+          <ac:picMkLst>
+            <pc:docMk/>
+            <pc:sldMk cId="666266812" sldId="323"/>
+            <ac:picMk id="10" creationId="{A33A277B-5AE3-F7CB-53DE-740853C4EB53}"/>
+          </ac:picMkLst>
+        </pc:picChg>
+      </pc:sldChg>
+      <pc:sldChg chg="addSp modSp add mod">
+        <pc:chgData name="Martin Garrad" userId="29fa8137-b5d4-4adf-94e3-55aca812c4da" providerId="ADAL" clId="{FE7E3326-2F4E-5A39-AD8A-48BAAAFC5A20}" dt="2026-01-29T12:27:40.682" v="541" actId="14100"/>
+        <pc:sldMkLst>
+          <pc:docMk/>
+          <pc:sldMk cId="3705673433" sldId="324"/>
+        </pc:sldMkLst>
+        <pc:spChg chg="add mod">
+          <ac:chgData name="Martin Garrad" userId="29fa8137-b5d4-4adf-94e3-55aca812c4da" providerId="ADAL" clId="{FE7E3326-2F4E-5A39-AD8A-48BAAAFC5A20}" dt="2026-01-29T12:26:34.404" v="533" actId="14100"/>
+          <ac:spMkLst>
+            <pc:docMk/>
+            <pc:sldMk cId="3705673433" sldId="324"/>
+            <ac:spMk id="3" creationId="{05F190CA-FD7E-2DF7-7AFD-3D67B726BA4B}"/>
+          </ac:spMkLst>
+        </pc:spChg>
+        <pc:spChg chg="add mod">
+          <ac:chgData name="Martin Garrad" userId="29fa8137-b5d4-4adf-94e3-55aca812c4da" providerId="ADAL" clId="{FE7E3326-2F4E-5A39-AD8A-48BAAAFC5A20}" dt="2026-01-29T12:27:27.819" v="538" actId="1076"/>
+          <ac:spMkLst>
+            <pc:docMk/>
+            <pc:sldMk cId="3705673433" sldId="324"/>
+            <ac:spMk id="4" creationId="{B629B7DF-73D7-128F-739B-62B963B115CF}"/>
+          </ac:spMkLst>
+        </pc:spChg>
+        <pc:spChg chg="add mod">
+          <ac:chgData name="Martin Garrad" userId="29fa8137-b5d4-4adf-94e3-55aca812c4da" providerId="ADAL" clId="{FE7E3326-2F4E-5A39-AD8A-48BAAAFC5A20}" dt="2026-01-29T12:27:40.682" v="541" actId="14100"/>
+          <ac:spMkLst>
+            <pc:docMk/>
+            <pc:sldMk cId="3705673433" sldId="324"/>
+            <ac:spMk id="5" creationId="{DFCC9993-39B6-9B62-FD8B-A46990F56060}"/>
+          </ac:spMkLst>
+        </pc:spChg>
+        <pc:picChg chg="mod">
+          <ac:chgData name="Martin Garrad" userId="29fa8137-b5d4-4adf-94e3-55aca812c4da" providerId="ADAL" clId="{FE7E3326-2F4E-5A39-AD8A-48BAAAFC5A20}" dt="2026-01-29T12:27:17.321" v="537" actId="1076"/>
+          <ac:picMkLst>
+            <pc:docMk/>
+            <pc:sldMk cId="3705673433" sldId="324"/>
+            <ac:picMk id="10" creationId="{939B82AC-7725-5E65-8781-FB60C32461AC}"/>
+          </ac:picMkLst>
+        </pc:picChg>
+      </pc:sldChg>
+    </pc:docChg>
+  </pc:docChgLst>
+</pc:chgInfo>
+</file>
+
 <file path=ppt/slideLayouts/slideLayout1.xml><?xml version="1.0" encoding="utf-8"?>
 <p:sldLayout xmlns:a="http://schemas.openxmlformats.org/drawingml/2006/main" xmlns:r="http://schemas.openxmlformats.org/officeDocument/2006/relationships" xmlns:p="http://schemas.openxmlformats.org/presentationml/2006/main" type="title" preserve="1">
   <p:cSld name="Title Slide">
@@ -279,7 +554,7 @@
           <a:p>
             <a:fld id="{8DA19F51-38A4-42E7-8F0D-4595786FECBD}" type="datetimeFigureOut">
               <a:rPr lang="en-GB" smtClean="0"/>
-              <a:t>13/01/2026</a:t>
+              <a:t>29/01/2026</a:t>
             </a:fld>
             <a:endParaRPr lang="en-GB"/>
           </a:p>
@@ -479,7 +754,7 @@
           <a:p>
             <a:fld id="{8DA19F51-38A4-42E7-8F0D-4595786FECBD}" type="datetimeFigureOut">
               <a:rPr lang="en-GB" smtClean="0"/>
-              <a:t>13/01/2026</a:t>
+              <a:t>29/01/2026</a:t>
             </a:fld>
             <a:endParaRPr lang="en-GB"/>
           </a:p>
@@ -689,7 +964,7 @@
           <a:p>
             <a:fld id="{8DA19F51-38A4-42E7-8F0D-4595786FECBD}" type="datetimeFigureOut">
               <a:rPr lang="en-GB" smtClean="0"/>
-              <a:t>13/01/2026</a:t>
+              <a:t>29/01/2026</a:t>
             </a:fld>
             <a:endParaRPr lang="en-GB"/>
           </a:p>
@@ -889,7 +1164,7 @@
           <a:p>
             <a:fld id="{8DA19F51-38A4-42E7-8F0D-4595786FECBD}" type="datetimeFigureOut">
               <a:rPr lang="en-GB" smtClean="0"/>
-              <a:t>13/01/2026</a:t>
+              <a:t>29/01/2026</a:t>
             </a:fld>
             <a:endParaRPr lang="en-GB"/>
           </a:p>
@@ -1165,7 +1440,7 @@
           <a:p>
             <a:fld id="{8DA19F51-38A4-42E7-8F0D-4595786FECBD}" type="datetimeFigureOut">
               <a:rPr lang="en-GB" smtClean="0"/>
-              <a:t>13/01/2026</a:t>
+              <a:t>29/01/2026</a:t>
             </a:fld>
             <a:endParaRPr lang="en-GB"/>
           </a:p>
@@ -1433,7 +1708,7 @@
           <a:p>
             <a:fld id="{8DA19F51-38A4-42E7-8F0D-4595786FECBD}" type="datetimeFigureOut">
               <a:rPr lang="en-GB" smtClean="0"/>
-              <a:t>13/01/2026</a:t>
+              <a:t>29/01/2026</a:t>
             </a:fld>
             <a:endParaRPr lang="en-GB"/>
           </a:p>
@@ -1848,7 +2123,7 @@
           <a:p>
             <a:fld id="{8DA19F51-38A4-42E7-8F0D-4595786FECBD}" type="datetimeFigureOut">
               <a:rPr lang="en-GB" smtClean="0"/>
-              <a:t>13/01/2026</a:t>
+              <a:t>29/01/2026</a:t>
             </a:fld>
             <a:endParaRPr lang="en-GB"/>
           </a:p>
@@ -1990,7 +2265,7 @@
           <a:p>
             <a:fld id="{8DA19F51-38A4-42E7-8F0D-4595786FECBD}" type="datetimeFigureOut">
               <a:rPr lang="en-GB" smtClean="0"/>
-              <a:t>13/01/2026</a:t>
+              <a:t>29/01/2026</a:t>
             </a:fld>
             <a:endParaRPr lang="en-GB"/>
           </a:p>
@@ -2103,7 +2378,7 @@
           <a:p>
             <a:fld id="{8DA19F51-38A4-42E7-8F0D-4595786FECBD}" type="datetimeFigureOut">
               <a:rPr lang="en-GB" smtClean="0"/>
-              <a:t>13/01/2026</a:t>
+              <a:t>29/01/2026</a:t>
             </a:fld>
             <a:endParaRPr lang="en-GB"/>
           </a:p>
@@ -2416,7 +2691,7 @@
           <a:p>
             <a:fld id="{8DA19F51-38A4-42E7-8F0D-4595786FECBD}" type="datetimeFigureOut">
               <a:rPr lang="en-GB" smtClean="0"/>
-              <a:t>13/01/2026</a:t>
+              <a:t>29/01/2026</a:t>
             </a:fld>
             <a:endParaRPr lang="en-GB"/>
           </a:p>
@@ -2705,7 +2980,7 @@
           <a:p>
             <a:fld id="{8DA19F51-38A4-42E7-8F0D-4595786FECBD}" type="datetimeFigureOut">
               <a:rPr lang="en-GB" smtClean="0"/>
-              <a:t>13/01/2026</a:t>
+              <a:t>29/01/2026</a:t>
             </a:fld>
             <a:endParaRPr lang="en-GB"/>
           </a:p>
@@ -2948,7 +3223,7 @@
           <a:p>
             <a:fld id="{8DA19F51-38A4-42E7-8F0D-4595786FECBD}" type="datetimeFigureOut">
               <a:rPr lang="en-GB" smtClean="0"/>
-              <a:t>13/01/2026</a:t>
+              <a:t>29/01/2026</a:t>
             </a:fld>
             <a:endParaRPr lang="en-GB"/>
           </a:p>
@@ -3383,12 +3658,21 @@
         </p:nvSpPr>
         <p:spPr/>
         <p:txBody>
-          <a:bodyPr/>
+          <a:bodyPr>
+            <a:normAutofit/>
+          </a:bodyPr>
           <a:lstStyle/>
           <a:p>
             <a:r>
               <a:rPr lang="en-GB" dirty="0"/>
               <a:t>Computer Programming and Algorithms</a:t>
+            </a:r>
+            <a:br>
+              <a:rPr lang="en-GB" dirty="0"/>
+            </a:br>
+            <a:r>
+              <a:rPr lang="en-GB" sz="4400" dirty="0"/>
+              <a:t>Errors and Debugging</a:t>
             </a:r>
           </a:p>
         </p:txBody>
@@ -5310,635 +5594,614 @@
           </a:p>
         </p:txBody>
       </p:sp>
-      <p:grpSp>
-        <p:nvGrpSpPr>
-          <p:cNvPr id="18" name="Group 17">
-            <a:extLst>
-              <a:ext uri="{FF2B5EF4-FFF2-40B4-BE49-F238E27FC236}">
-                <a16:creationId xmlns:a16="http://schemas.microsoft.com/office/drawing/2014/main" id="{C5D03A9F-B079-F904-C554-CEE9FE233E58}"/>
-              </a:ext>
-            </a:extLst>
-          </p:cNvPr>
-          <p:cNvGrpSpPr/>
+      <p:pic>
+        <p:nvPicPr>
+          <p:cNvPr id="5" name="Picture 4" descr="A computer screen shot of a program&#10;&#10;Description automatically generated">
+            <a:extLst>
+              <a:ext uri="{FF2B5EF4-FFF2-40B4-BE49-F238E27FC236}">
+                <a16:creationId xmlns:a16="http://schemas.microsoft.com/office/drawing/2014/main" id="{471EB7D6-DCE6-DBA7-CD13-BF5686312CDC}"/>
+              </a:ext>
+            </a:extLst>
+          </p:cNvPr>
+          <p:cNvPicPr>
+            <a:picLocks noChangeAspect="1"/>
+          </p:cNvPicPr>
           <p:nvPr/>
-        </p:nvGrpSpPr>
-        <p:grpSpPr>
+        </p:nvPicPr>
+        <p:blipFill>
+          <a:blip r:embed="rId2">
+            <a:extLst>
+              <a:ext uri="{28A0092B-C50C-407E-A947-70E740481C1C}">
+                <a14:useLocalDpi xmlns:a14="http://schemas.microsoft.com/office/drawing/2010/main" val="0"/>
+              </a:ext>
+            </a:extLst>
+          </a:blip>
+          <a:stretch>
+            <a:fillRect/>
+          </a:stretch>
+        </p:blipFill>
+        <p:spPr>
           <a:xfrm>
             <a:off x="2495550" y="2058797"/>
-            <a:ext cx="7200900" cy="3243663"/>
-            <a:chOff x="2495550" y="2951163"/>
-            <a:chExt cx="7200900" cy="3243663"/>
+            <a:ext cx="7200900" cy="3225800"/>
           </a:xfrm>
-        </p:grpSpPr>
-        <p:pic>
-          <p:nvPicPr>
-            <p:cNvPr id="5" name="Picture 4" descr="A computer screen shot of a program&#10;&#10;Description automatically generated">
-              <a:extLst>
-                <a:ext uri="{FF2B5EF4-FFF2-40B4-BE49-F238E27FC236}">
-                  <a16:creationId xmlns:a16="http://schemas.microsoft.com/office/drawing/2014/main" id="{471EB7D6-DCE6-DBA7-CD13-BF5686312CDC}"/>
-                </a:ext>
-              </a:extLst>
-            </p:cNvPr>
-            <p:cNvPicPr>
-              <a:picLocks noChangeAspect="1"/>
-            </p:cNvPicPr>
-            <p:nvPr/>
-          </p:nvPicPr>
-          <p:blipFill>
-            <a:blip r:embed="rId2">
-              <a:extLst>
-                <a:ext uri="{28A0092B-C50C-407E-A947-70E740481C1C}">
-                  <a14:useLocalDpi xmlns:a14="http://schemas.microsoft.com/office/drawing/2010/main" val="0"/>
-                </a:ext>
-              </a:extLst>
-            </a:blip>
-            <a:stretch>
-              <a:fillRect/>
-            </a:stretch>
-          </p:blipFill>
-          <p:spPr>
-            <a:xfrm>
-              <a:off x="2495550" y="2951163"/>
-              <a:ext cx="7200900" cy="3225800"/>
-            </a:xfrm>
-            <a:prstGeom prst="rect">
-              <a:avLst/>
-            </a:prstGeom>
-          </p:spPr>
-        </p:pic>
-        <p:sp>
-          <p:nvSpPr>
-            <p:cNvPr id="6" name="Rectangle 5">
-              <a:extLst>
-                <a:ext uri="{FF2B5EF4-FFF2-40B4-BE49-F238E27FC236}">
-                  <a16:creationId xmlns:a16="http://schemas.microsoft.com/office/drawing/2014/main" id="{99275E9E-455D-20AD-EDEE-ABE50C1F64F0}"/>
-                </a:ext>
-              </a:extLst>
-            </p:cNvPr>
-            <p:cNvSpPr/>
-            <p:nvPr/>
-          </p:nvSpPr>
-          <p:spPr>
-            <a:xfrm>
-              <a:off x="2495550" y="5107259"/>
-              <a:ext cx="7200900" cy="858643"/>
-            </a:xfrm>
-            <a:prstGeom prst="rect">
-              <a:avLst/>
-            </a:prstGeom>
-            <a:noFill/>
-            <a:ln w="28575">
-              <a:solidFill>
-                <a:srgbClr val="FF0000"/>
-              </a:solidFill>
-            </a:ln>
-          </p:spPr>
-          <p:style>
-            <a:lnRef idx="2">
-              <a:schemeClr val="accent1">
-                <a:shade val="15000"/>
-              </a:schemeClr>
-            </a:lnRef>
-            <a:fillRef idx="1">
+          <a:prstGeom prst="rect">
+            <a:avLst/>
+          </a:prstGeom>
+        </p:spPr>
+      </p:pic>
+      <p:sp>
+        <p:nvSpPr>
+          <p:cNvPr id="6" name="Rectangle 5">
+            <a:extLst>
+              <a:ext uri="{FF2B5EF4-FFF2-40B4-BE49-F238E27FC236}">
+                <a16:creationId xmlns:a16="http://schemas.microsoft.com/office/drawing/2014/main" id="{99275E9E-455D-20AD-EDEE-ABE50C1F64F0}"/>
+              </a:ext>
+            </a:extLst>
+          </p:cNvPr>
+          <p:cNvSpPr/>
+          <p:nvPr/>
+        </p:nvSpPr>
+        <p:spPr>
+          <a:xfrm>
+            <a:off x="2495550" y="4214893"/>
+            <a:ext cx="7200900" cy="858643"/>
+          </a:xfrm>
+          <a:prstGeom prst="rect">
+            <a:avLst/>
+          </a:prstGeom>
+          <a:noFill/>
+          <a:ln w="28575">
+            <a:solidFill>
+              <a:srgbClr val="FF0000"/>
+            </a:solidFill>
+          </a:ln>
+        </p:spPr>
+        <p:style>
+          <a:lnRef idx="2">
+            <a:schemeClr val="accent1">
+              <a:shade val="15000"/>
+            </a:schemeClr>
+          </a:lnRef>
+          <a:fillRef idx="1">
+            <a:schemeClr val="accent1"/>
+          </a:fillRef>
+          <a:effectRef idx="0">
+            <a:schemeClr val="accent1"/>
+          </a:effectRef>
+          <a:fontRef idx="minor">
+            <a:schemeClr val="lt1"/>
+          </a:fontRef>
+        </p:style>
+        <p:txBody>
+          <a:bodyPr rtlCol="0" anchor="ctr"/>
+          <a:lstStyle/>
+          <a:p>
+            <a:pPr algn="ctr"/>
+            <a:endParaRPr lang="en-US"/>
+          </a:p>
+        </p:txBody>
+      </p:sp>
+      <p:sp>
+        <p:nvSpPr>
+          <p:cNvPr id="7" name="Rectangle 6">
+            <a:extLst>
+              <a:ext uri="{FF2B5EF4-FFF2-40B4-BE49-F238E27FC236}">
+                <a16:creationId xmlns:a16="http://schemas.microsoft.com/office/drawing/2014/main" id="{86926D97-EE7A-A3A6-442E-54BFFD576D59}"/>
+              </a:ext>
+            </a:extLst>
+          </p:cNvPr>
+          <p:cNvSpPr/>
+          <p:nvPr/>
+        </p:nvSpPr>
+        <p:spPr>
+          <a:xfrm>
+            <a:off x="2495550" y="3356250"/>
+            <a:ext cx="7200900" cy="858643"/>
+          </a:xfrm>
+          <a:prstGeom prst="rect">
+            <a:avLst/>
+          </a:prstGeom>
+          <a:noFill/>
+          <a:ln w="28575">
+            <a:solidFill>
+              <a:srgbClr val="FF0000"/>
+            </a:solidFill>
+          </a:ln>
+        </p:spPr>
+        <p:style>
+          <a:lnRef idx="2">
+            <a:schemeClr val="accent1">
+              <a:shade val="15000"/>
+            </a:schemeClr>
+          </a:lnRef>
+          <a:fillRef idx="1">
+            <a:schemeClr val="accent1"/>
+          </a:fillRef>
+          <a:effectRef idx="0">
+            <a:schemeClr val="accent1"/>
+          </a:effectRef>
+          <a:fontRef idx="minor">
+            <a:schemeClr val="lt1"/>
+          </a:fontRef>
+        </p:style>
+        <p:txBody>
+          <a:bodyPr rtlCol="0" anchor="ctr"/>
+          <a:lstStyle/>
+          <a:p>
+            <a:pPr algn="ctr"/>
+            <a:endParaRPr lang="en-US"/>
+          </a:p>
+        </p:txBody>
+      </p:sp>
+      <p:sp>
+        <p:nvSpPr>
+          <p:cNvPr id="8" name="Rectangle 7">
+            <a:extLst>
+              <a:ext uri="{FF2B5EF4-FFF2-40B4-BE49-F238E27FC236}">
+                <a16:creationId xmlns:a16="http://schemas.microsoft.com/office/drawing/2014/main" id="{B2EEA638-BA77-1BE3-2C92-9A33495FB7E4}"/>
+              </a:ext>
+            </a:extLst>
+          </p:cNvPr>
+          <p:cNvSpPr/>
+          <p:nvPr/>
+        </p:nvSpPr>
+        <p:spPr>
+          <a:xfrm>
+            <a:off x="2495550" y="2497607"/>
+            <a:ext cx="7200900" cy="858643"/>
+          </a:xfrm>
+          <a:prstGeom prst="rect">
+            <a:avLst/>
+          </a:prstGeom>
+          <a:noFill/>
+          <a:ln w="28575">
+            <a:solidFill>
+              <a:srgbClr val="FF0000"/>
+            </a:solidFill>
+          </a:ln>
+        </p:spPr>
+        <p:style>
+          <a:lnRef idx="2">
+            <a:schemeClr val="accent1">
+              <a:shade val="15000"/>
+            </a:schemeClr>
+          </a:lnRef>
+          <a:fillRef idx="1">
+            <a:schemeClr val="accent1"/>
+          </a:fillRef>
+          <a:effectRef idx="0">
+            <a:schemeClr val="accent1"/>
+          </a:effectRef>
+          <a:fontRef idx="minor">
+            <a:schemeClr val="lt1"/>
+          </a:fontRef>
+        </p:style>
+        <p:txBody>
+          <a:bodyPr rtlCol="0" anchor="ctr"/>
+          <a:lstStyle/>
+          <a:p>
+            <a:pPr algn="ctr"/>
+            <a:endParaRPr lang="en-US"/>
+          </a:p>
+        </p:txBody>
+      </p:sp>
+      <p:sp>
+        <p:nvSpPr>
+          <p:cNvPr id="9" name="Rectangle 8">
+            <a:extLst>
+              <a:ext uri="{FF2B5EF4-FFF2-40B4-BE49-F238E27FC236}">
+                <a16:creationId xmlns:a16="http://schemas.microsoft.com/office/drawing/2014/main" id="{B9452BB6-2745-9BF1-D0B0-86981AD9B7E8}"/>
+              </a:ext>
+            </a:extLst>
+          </p:cNvPr>
+          <p:cNvSpPr/>
+          <p:nvPr/>
+        </p:nvSpPr>
+        <p:spPr>
+          <a:xfrm>
+            <a:off x="2495550" y="5073535"/>
+            <a:ext cx="5535746" cy="211062"/>
+          </a:xfrm>
+          <a:prstGeom prst="rect">
+            <a:avLst/>
+          </a:prstGeom>
+          <a:noFill/>
+          <a:ln w="28575">
+            <a:solidFill>
+              <a:srgbClr val="FF0000"/>
+            </a:solidFill>
+          </a:ln>
+        </p:spPr>
+        <p:style>
+          <a:lnRef idx="2">
+            <a:schemeClr val="accent1">
+              <a:shade val="15000"/>
+            </a:schemeClr>
+          </a:lnRef>
+          <a:fillRef idx="1">
+            <a:schemeClr val="accent1"/>
+          </a:fillRef>
+          <a:effectRef idx="0">
+            <a:schemeClr val="accent1"/>
+          </a:effectRef>
+          <a:fontRef idx="minor">
+            <a:schemeClr val="lt1"/>
+          </a:fontRef>
+        </p:style>
+        <p:txBody>
+          <a:bodyPr rtlCol="0" anchor="ctr"/>
+          <a:lstStyle/>
+          <a:p>
+            <a:pPr algn="ctr"/>
+            <a:endParaRPr lang="en-US"/>
+          </a:p>
+        </p:txBody>
+      </p:sp>
+      <p:sp>
+        <p:nvSpPr>
+          <p:cNvPr id="4" name="Rectangle 3">
+            <a:extLst>
+              <a:ext uri="{FF2B5EF4-FFF2-40B4-BE49-F238E27FC236}">
+                <a16:creationId xmlns:a16="http://schemas.microsoft.com/office/drawing/2014/main" id="{9098035E-25FB-14A8-140C-9C380F0235A9}"/>
+              </a:ext>
+            </a:extLst>
+          </p:cNvPr>
+          <p:cNvSpPr/>
+          <p:nvPr/>
+        </p:nvSpPr>
+        <p:spPr>
+          <a:xfrm>
+            <a:off x="2495551" y="5091398"/>
+            <a:ext cx="985780" cy="211062"/>
+          </a:xfrm>
+          <a:prstGeom prst="rect">
+            <a:avLst/>
+          </a:prstGeom>
+          <a:noFill/>
+          <a:ln w="28575">
+            <a:solidFill>
               <a:schemeClr val="accent1"/>
-            </a:fillRef>
-            <a:effectRef idx="0">
+            </a:solidFill>
+          </a:ln>
+        </p:spPr>
+        <p:style>
+          <a:lnRef idx="2">
+            <a:schemeClr val="accent1">
+              <a:shade val="15000"/>
+            </a:schemeClr>
+          </a:lnRef>
+          <a:fillRef idx="1">
+            <a:schemeClr val="accent1"/>
+          </a:fillRef>
+          <a:effectRef idx="0">
+            <a:schemeClr val="accent1"/>
+          </a:effectRef>
+          <a:fontRef idx="minor">
+            <a:schemeClr val="lt1"/>
+          </a:fontRef>
+        </p:style>
+        <p:txBody>
+          <a:bodyPr rtlCol="0" anchor="ctr"/>
+          <a:lstStyle/>
+          <a:p>
+            <a:pPr algn="ctr"/>
+            <a:endParaRPr lang="en-US"/>
+          </a:p>
+        </p:txBody>
+      </p:sp>
+      <p:sp>
+        <p:nvSpPr>
+          <p:cNvPr id="10" name="Rectangle 9">
+            <a:extLst>
+              <a:ext uri="{FF2B5EF4-FFF2-40B4-BE49-F238E27FC236}">
+                <a16:creationId xmlns:a16="http://schemas.microsoft.com/office/drawing/2014/main" id="{9BC05C64-4E90-EE8D-ACAB-C29102DDD8C7}"/>
+              </a:ext>
+            </a:extLst>
+          </p:cNvPr>
+          <p:cNvSpPr/>
+          <p:nvPr/>
+        </p:nvSpPr>
+        <p:spPr>
+          <a:xfrm>
+            <a:off x="2823784" y="4880336"/>
+            <a:ext cx="2221941" cy="211062"/>
+          </a:xfrm>
+          <a:prstGeom prst="rect">
+            <a:avLst/>
+          </a:prstGeom>
+          <a:noFill/>
+          <a:ln w="28575">
+            <a:solidFill>
               <a:schemeClr val="accent1"/>
-            </a:effectRef>
-            <a:fontRef idx="minor">
-              <a:schemeClr val="lt1"/>
-            </a:fontRef>
-          </p:style>
-          <p:txBody>
-            <a:bodyPr rtlCol="0" anchor="ctr"/>
-            <a:lstStyle/>
-            <a:p>
-              <a:pPr algn="ctr"/>
-              <a:endParaRPr lang="en-US"/>
-            </a:p>
-          </p:txBody>
-        </p:sp>
-        <p:sp>
-          <p:nvSpPr>
-            <p:cNvPr id="7" name="Rectangle 6">
-              <a:extLst>
-                <a:ext uri="{FF2B5EF4-FFF2-40B4-BE49-F238E27FC236}">
-                  <a16:creationId xmlns:a16="http://schemas.microsoft.com/office/drawing/2014/main" id="{86926D97-EE7A-A3A6-442E-54BFFD576D59}"/>
-                </a:ext>
-              </a:extLst>
-            </p:cNvPr>
-            <p:cNvSpPr/>
-            <p:nvPr/>
-          </p:nvSpPr>
-          <p:spPr>
-            <a:xfrm>
-              <a:off x="2495550" y="4248616"/>
-              <a:ext cx="7200900" cy="858643"/>
-            </a:xfrm>
-            <a:prstGeom prst="rect">
-              <a:avLst/>
-            </a:prstGeom>
-            <a:noFill/>
-            <a:ln w="28575">
-              <a:solidFill>
-                <a:srgbClr val="FF0000"/>
-              </a:solidFill>
-            </a:ln>
-          </p:spPr>
-          <p:style>
-            <a:lnRef idx="2">
-              <a:schemeClr val="accent1">
-                <a:shade val="15000"/>
-              </a:schemeClr>
-            </a:lnRef>
-            <a:fillRef idx="1">
+            </a:solidFill>
+          </a:ln>
+        </p:spPr>
+        <p:style>
+          <a:lnRef idx="2">
+            <a:schemeClr val="accent1">
+              <a:shade val="15000"/>
+            </a:schemeClr>
+          </a:lnRef>
+          <a:fillRef idx="1">
+            <a:schemeClr val="accent1"/>
+          </a:fillRef>
+          <a:effectRef idx="0">
+            <a:schemeClr val="accent1"/>
+          </a:effectRef>
+          <a:fontRef idx="minor">
+            <a:schemeClr val="lt1"/>
+          </a:fontRef>
+        </p:style>
+        <p:txBody>
+          <a:bodyPr rtlCol="0" anchor="ctr"/>
+          <a:lstStyle/>
+          <a:p>
+            <a:pPr algn="ctr"/>
+            <a:endParaRPr lang="en-US"/>
+          </a:p>
+        </p:txBody>
+      </p:sp>
+      <p:sp>
+        <p:nvSpPr>
+          <p:cNvPr id="11" name="Rectangle 10">
+            <a:extLst>
+              <a:ext uri="{FF2B5EF4-FFF2-40B4-BE49-F238E27FC236}">
+                <a16:creationId xmlns:a16="http://schemas.microsoft.com/office/drawing/2014/main" id="{31105044-9D09-3C56-850D-25A5D49A6A34}"/>
+              </a:ext>
+            </a:extLst>
+          </p:cNvPr>
+          <p:cNvSpPr/>
+          <p:nvPr/>
+        </p:nvSpPr>
+        <p:spPr>
+          <a:xfrm>
+            <a:off x="2823784" y="4003832"/>
+            <a:ext cx="6694789" cy="219992"/>
+          </a:xfrm>
+          <a:prstGeom prst="rect">
+            <a:avLst/>
+          </a:prstGeom>
+          <a:noFill/>
+          <a:ln w="28575">
+            <a:solidFill>
               <a:schemeClr val="accent1"/>
-            </a:fillRef>
-            <a:effectRef idx="0">
+            </a:solidFill>
+          </a:ln>
+        </p:spPr>
+        <p:style>
+          <a:lnRef idx="2">
+            <a:schemeClr val="accent1">
+              <a:shade val="15000"/>
+            </a:schemeClr>
+          </a:lnRef>
+          <a:fillRef idx="1">
+            <a:schemeClr val="accent1"/>
+          </a:fillRef>
+          <a:effectRef idx="0">
+            <a:schemeClr val="accent1"/>
+          </a:effectRef>
+          <a:fontRef idx="minor">
+            <a:schemeClr val="lt1"/>
+          </a:fontRef>
+        </p:style>
+        <p:txBody>
+          <a:bodyPr rtlCol="0" anchor="ctr"/>
+          <a:lstStyle/>
+          <a:p>
+            <a:pPr algn="ctr"/>
+            <a:endParaRPr lang="en-US"/>
+          </a:p>
+        </p:txBody>
+      </p:sp>
+      <p:sp>
+        <p:nvSpPr>
+          <p:cNvPr id="12" name="Rectangle 11">
+            <a:extLst>
+              <a:ext uri="{FF2B5EF4-FFF2-40B4-BE49-F238E27FC236}">
+                <a16:creationId xmlns:a16="http://schemas.microsoft.com/office/drawing/2014/main" id="{855B058E-9446-4CCD-AE87-FCB9822D919C}"/>
+              </a:ext>
+            </a:extLst>
+          </p:cNvPr>
+          <p:cNvSpPr/>
+          <p:nvPr/>
+        </p:nvSpPr>
+        <p:spPr>
+          <a:xfrm>
+            <a:off x="2823784" y="3109462"/>
+            <a:ext cx="1091235" cy="228925"/>
+          </a:xfrm>
+          <a:prstGeom prst="rect">
+            <a:avLst/>
+          </a:prstGeom>
+          <a:noFill/>
+          <a:ln w="28575">
+            <a:solidFill>
               <a:schemeClr val="accent1"/>
-            </a:effectRef>
-            <a:fontRef idx="minor">
-              <a:schemeClr val="lt1"/>
-            </a:fontRef>
-          </p:style>
-          <p:txBody>
-            <a:bodyPr rtlCol="0" anchor="ctr"/>
-            <a:lstStyle/>
-            <a:p>
-              <a:pPr algn="ctr"/>
-              <a:endParaRPr lang="en-US"/>
-            </a:p>
-          </p:txBody>
-        </p:sp>
-        <p:sp>
-          <p:nvSpPr>
-            <p:cNvPr id="8" name="Rectangle 7">
-              <a:extLst>
-                <a:ext uri="{FF2B5EF4-FFF2-40B4-BE49-F238E27FC236}">
-                  <a16:creationId xmlns:a16="http://schemas.microsoft.com/office/drawing/2014/main" id="{B2EEA638-BA77-1BE3-2C92-9A33495FB7E4}"/>
-                </a:ext>
-              </a:extLst>
-            </p:cNvPr>
-            <p:cNvSpPr/>
-            <p:nvPr/>
-          </p:nvSpPr>
-          <p:spPr>
-            <a:xfrm>
-              <a:off x="2495550" y="3389973"/>
-              <a:ext cx="7200900" cy="858643"/>
-            </a:xfrm>
-            <a:prstGeom prst="rect">
-              <a:avLst/>
-            </a:prstGeom>
-            <a:noFill/>
-            <a:ln w="28575">
-              <a:solidFill>
-                <a:srgbClr val="FF0000"/>
-              </a:solidFill>
-            </a:ln>
-          </p:spPr>
-          <p:style>
-            <a:lnRef idx="2">
-              <a:schemeClr val="accent1">
-                <a:shade val="15000"/>
-              </a:schemeClr>
-            </a:lnRef>
-            <a:fillRef idx="1">
+            </a:solidFill>
+          </a:ln>
+        </p:spPr>
+        <p:style>
+          <a:lnRef idx="2">
+            <a:schemeClr val="accent1">
+              <a:shade val="15000"/>
+            </a:schemeClr>
+          </a:lnRef>
+          <a:fillRef idx="1">
+            <a:schemeClr val="accent1"/>
+          </a:fillRef>
+          <a:effectRef idx="0">
+            <a:schemeClr val="accent1"/>
+          </a:effectRef>
+          <a:fontRef idx="minor">
+            <a:schemeClr val="lt1"/>
+          </a:fontRef>
+        </p:style>
+        <p:txBody>
+          <a:bodyPr rtlCol="0" anchor="ctr"/>
+          <a:lstStyle/>
+          <a:p>
+            <a:pPr algn="ctr"/>
+            <a:endParaRPr lang="en-US"/>
+          </a:p>
+        </p:txBody>
+      </p:sp>
+      <p:sp>
+        <p:nvSpPr>
+          <p:cNvPr id="13" name="Rectangle 12">
+            <a:extLst>
+              <a:ext uri="{FF2B5EF4-FFF2-40B4-BE49-F238E27FC236}">
+                <a16:creationId xmlns:a16="http://schemas.microsoft.com/office/drawing/2014/main" id="{DB708F05-7868-ECDE-51ED-E69E1E145536}"/>
+              </a:ext>
+            </a:extLst>
+          </p:cNvPr>
+          <p:cNvSpPr/>
+          <p:nvPr/>
+        </p:nvSpPr>
+        <p:spPr>
+          <a:xfrm>
+            <a:off x="8231231" y="2708668"/>
+            <a:ext cx="780568" cy="228925"/>
+          </a:xfrm>
+          <a:prstGeom prst="rect">
+            <a:avLst/>
+          </a:prstGeom>
+          <a:noFill/>
+          <a:ln w="28575">
+            <a:solidFill>
               <a:schemeClr val="accent1"/>
-            </a:fillRef>
-            <a:effectRef idx="0">
+            </a:solidFill>
+          </a:ln>
+        </p:spPr>
+        <p:style>
+          <a:lnRef idx="2">
+            <a:schemeClr val="accent1">
+              <a:shade val="15000"/>
+            </a:schemeClr>
+          </a:lnRef>
+          <a:fillRef idx="1">
+            <a:schemeClr val="accent1"/>
+          </a:fillRef>
+          <a:effectRef idx="0">
+            <a:schemeClr val="accent1"/>
+          </a:effectRef>
+          <a:fontRef idx="minor">
+            <a:schemeClr val="lt1"/>
+          </a:fontRef>
+        </p:style>
+        <p:txBody>
+          <a:bodyPr rtlCol="0" anchor="ctr"/>
+          <a:lstStyle/>
+          <a:p>
+            <a:pPr algn="ctr"/>
+            <a:endParaRPr lang="en-US"/>
+          </a:p>
+        </p:txBody>
+      </p:sp>
+      <p:sp>
+        <p:nvSpPr>
+          <p:cNvPr id="14" name="Rectangle 13">
+            <a:extLst>
+              <a:ext uri="{FF2B5EF4-FFF2-40B4-BE49-F238E27FC236}">
+                <a16:creationId xmlns:a16="http://schemas.microsoft.com/office/drawing/2014/main" id="{88331CCF-ED3C-4DEB-F180-F3753126A50A}"/>
+              </a:ext>
+            </a:extLst>
+          </p:cNvPr>
+          <p:cNvSpPr/>
+          <p:nvPr/>
+        </p:nvSpPr>
+        <p:spPr>
+          <a:xfrm>
+            <a:off x="8264283" y="3585175"/>
+            <a:ext cx="747516" cy="209328"/>
+          </a:xfrm>
+          <a:prstGeom prst="rect">
+            <a:avLst/>
+          </a:prstGeom>
+          <a:noFill/>
+          <a:ln w="28575">
+            <a:solidFill>
               <a:schemeClr val="accent1"/>
-            </a:effectRef>
-            <a:fontRef idx="minor">
-              <a:schemeClr val="lt1"/>
-            </a:fontRef>
-          </p:style>
-          <p:txBody>
-            <a:bodyPr rtlCol="0" anchor="ctr"/>
-            <a:lstStyle/>
-            <a:p>
-              <a:pPr algn="ctr"/>
-              <a:endParaRPr lang="en-US"/>
-            </a:p>
-          </p:txBody>
-        </p:sp>
-        <p:sp>
-          <p:nvSpPr>
-            <p:cNvPr id="9" name="Rectangle 8">
-              <a:extLst>
-                <a:ext uri="{FF2B5EF4-FFF2-40B4-BE49-F238E27FC236}">
-                  <a16:creationId xmlns:a16="http://schemas.microsoft.com/office/drawing/2014/main" id="{B9452BB6-2745-9BF1-D0B0-86981AD9B7E8}"/>
-                </a:ext>
-              </a:extLst>
-            </p:cNvPr>
-            <p:cNvSpPr/>
-            <p:nvPr/>
-          </p:nvSpPr>
-          <p:spPr>
-            <a:xfrm>
-              <a:off x="2495550" y="5965901"/>
-              <a:ext cx="5535746" cy="211062"/>
-            </a:xfrm>
-            <a:prstGeom prst="rect">
-              <a:avLst/>
-            </a:prstGeom>
-            <a:noFill/>
-            <a:ln w="28575">
-              <a:solidFill>
-                <a:srgbClr val="FF0000"/>
-              </a:solidFill>
-            </a:ln>
-          </p:spPr>
-          <p:style>
-            <a:lnRef idx="2">
-              <a:schemeClr val="accent1">
-                <a:shade val="15000"/>
-              </a:schemeClr>
-            </a:lnRef>
-            <a:fillRef idx="1">
+            </a:solidFill>
+          </a:ln>
+        </p:spPr>
+        <p:style>
+          <a:lnRef idx="2">
+            <a:schemeClr val="accent1">
+              <a:shade val="15000"/>
+            </a:schemeClr>
+          </a:lnRef>
+          <a:fillRef idx="1">
+            <a:schemeClr val="accent1"/>
+          </a:fillRef>
+          <a:effectRef idx="0">
+            <a:schemeClr val="accent1"/>
+          </a:effectRef>
+          <a:fontRef idx="minor">
+            <a:schemeClr val="lt1"/>
+          </a:fontRef>
+        </p:style>
+        <p:txBody>
+          <a:bodyPr rtlCol="0" anchor="ctr"/>
+          <a:lstStyle/>
+          <a:p>
+            <a:pPr algn="ctr"/>
+            <a:endParaRPr lang="en-US"/>
+          </a:p>
+        </p:txBody>
+      </p:sp>
+      <p:sp>
+        <p:nvSpPr>
+          <p:cNvPr id="15" name="Rectangle 14">
+            <a:extLst>
+              <a:ext uri="{FF2B5EF4-FFF2-40B4-BE49-F238E27FC236}">
+                <a16:creationId xmlns:a16="http://schemas.microsoft.com/office/drawing/2014/main" id="{6EAB0810-A409-F56F-6F9E-BD05C05287E4}"/>
+              </a:ext>
+            </a:extLst>
+          </p:cNvPr>
+          <p:cNvSpPr/>
+          <p:nvPr/>
+        </p:nvSpPr>
+        <p:spPr>
+          <a:xfrm>
+            <a:off x="8264283" y="4433152"/>
+            <a:ext cx="780568" cy="228925"/>
+          </a:xfrm>
+          <a:prstGeom prst="rect">
+            <a:avLst/>
+          </a:prstGeom>
+          <a:noFill/>
+          <a:ln w="28575">
+            <a:solidFill>
               <a:schemeClr val="accent1"/>
-            </a:fillRef>
-            <a:effectRef idx="0">
-              <a:schemeClr val="accent1"/>
-            </a:effectRef>
-            <a:fontRef idx="minor">
-              <a:schemeClr val="lt1"/>
-            </a:fontRef>
-          </p:style>
-          <p:txBody>
-            <a:bodyPr rtlCol="0" anchor="ctr"/>
-            <a:lstStyle/>
-            <a:p>
-              <a:pPr algn="ctr"/>
-              <a:endParaRPr lang="en-US"/>
-            </a:p>
-          </p:txBody>
-        </p:sp>
-        <p:sp>
-          <p:nvSpPr>
-            <p:cNvPr id="4" name="Rectangle 3">
-              <a:extLst>
-                <a:ext uri="{FF2B5EF4-FFF2-40B4-BE49-F238E27FC236}">
-                  <a16:creationId xmlns:a16="http://schemas.microsoft.com/office/drawing/2014/main" id="{9098035E-25FB-14A8-140C-9C380F0235A9}"/>
-                </a:ext>
-              </a:extLst>
-            </p:cNvPr>
-            <p:cNvSpPr/>
-            <p:nvPr/>
-          </p:nvSpPr>
-          <p:spPr>
-            <a:xfrm>
-              <a:off x="2495551" y="5983764"/>
-              <a:ext cx="985780" cy="211062"/>
-            </a:xfrm>
-            <a:prstGeom prst="rect">
-              <a:avLst/>
-            </a:prstGeom>
-            <a:noFill/>
-            <a:ln w="28575">
-              <a:solidFill>
-                <a:schemeClr val="accent1"/>
-              </a:solidFill>
-            </a:ln>
-          </p:spPr>
-          <p:style>
-            <a:lnRef idx="2">
-              <a:schemeClr val="accent1">
-                <a:shade val="15000"/>
-              </a:schemeClr>
-            </a:lnRef>
-            <a:fillRef idx="1">
-              <a:schemeClr val="accent1"/>
-            </a:fillRef>
-            <a:effectRef idx="0">
-              <a:schemeClr val="accent1"/>
-            </a:effectRef>
-            <a:fontRef idx="minor">
-              <a:schemeClr val="lt1"/>
-            </a:fontRef>
-          </p:style>
-          <p:txBody>
-            <a:bodyPr rtlCol="0" anchor="ctr"/>
-            <a:lstStyle/>
-            <a:p>
-              <a:pPr algn="ctr"/>
-              <a:endParaRPr lang="en-US"/>
-            </a:p>
-          </p:txBody>
-        </p:sp>
-        <p:sp>
-          <p:nvSpPr>
-            <p:cNvPr id="10" name="Rectangle 9">
-              <a:extLst>
-                <a:ext uri="{FF2B5EF4-FFF2-40B4-BE49-F238E27FC236}">
-                  <a16:creationId xmlns:a16="http://schemas.microsoft.com/office/drawing/2014/main" id="{9BC05C64-4E90-EE8D-ACAB-C29102DDD8C7}"/>
-                </a:ext>
-              </a:extLst>
-            </p:cNvPr>
-            <p:cNvSpPr/>
-            <p:nvPr/>
-          </p:nvSpPr>
-          <p:spPr>
-            <a:xfrm>
-              <a:off x="2823784" y="5772702"/>
-              <a:ext cx="2221941" cy="211062"/>
-            </a:xfrm>
-            <a:prstGeom prst="rect">
-              <a:avLst/>
-            </a:prstGeom>
-            <a:noFill/>
-            <a:ln w="28575">
-              <a:solidFill>
-                <a:schemeClr val="accent1"/>
-              </a:solidFill>
-            </a:ln>
-          </p:spPr>
-          <p:style>
-            <a:lnRef idx="2">
-              <a:schemeClr val="accent1">
-                <a:shade val="15000"/>
-              </a:schemeClr>
-            </a:lnRef>
-            <a:fillRef idx="1">
-              <a:schemeClr val="accent1"/>
-            </a:fillRef>
-            <a:effectRef idx="0">
-              <a:schemeClr val="accent1"/>
-            </a:effectRef>
-            <a:fontRef idx="minor">
-              <a:schemeClr val="lt1"/>
-            </a:fontRef>
-          </p:style>
-          <p:txBody>
-            <a:bodyPr rtlCol="0" anchor="ctr"/>
-            <a:lstStyle/>
-            <a:p>
-              <a:pPr algn="ctr"/>
-              <a:endParaRPr lang="en-US"/>
-            </a:p>
-          </p:txBody>
-        </p:sp>
-        <p:sp>
-          <p:nvSpPr>
-            <p:cNvPr id="11" name="Rectangle 10">
-              <a:extLst>
-                <a:ext uri="{FF2B5EF4-FFF2-40B4-BE49-F238E27FC236}">
-                  <a16:creationId xmlns:a16="http://schemas.microsoft.com/office/drawing/2014/main" id="{31105044-9D09-3C56-850D-25A5D49A6A34}"/>
-                </a:ext>
-              </a:extLst>
-            </p:cNvPr>
-            <p:cNvSpPr/>
-            <p:nvPr/>
-          </p:nvSpPr>
-          <p:spPr>
-            <a:xfrm>
-              <a:off x="2823784" y="4896198"/>
-              <a:ext cx="6694789" cy="219992"/>
-            </a:xfrm>
-            <a:prstGeom prst="rect">
-              <a:avLst/>
-            </a:prstGeom>
-            <a:noFill/>
-            <a:ln w="28575">
-              <a:solidFill>
-                <a:schemeClr val="accent1"/>
-              </a:solidFill>
-            </a:ln>
-          </p:spPr>
-          <p:style>
-            <a:lnRef idx="2">
-              <a:schemeClr val="accent1">
-                <a:shade val="15000"/>
-              </a:schemeClr>
-            </a:lnRef>
-            <a:fillRef idx="1">
-              <a:schemeClr val="accent1"/>
-            </a:fillRef>
-            <a:effectRef idx="0">
-              <a:schemeClr val="accent1"/>
-            </a:effectRef>
-            <a:fontRef idx="minor">
-              <a:schemeClr val="lt1"/>
-            </a:fontRef>
-          </p:style>
-          <p:txBody>
-            <a:bodyPr rtlCol="0" anchor="ctr"/>
-            <a:lstStyle/>
-            <a:p>
-              <a:pPr algn="ctr"/>
-              <a:endParaRPr lang="en-US"/>
-            </a:p>
-          </p:txBody>
-        </p:sp>
-        <p:sp>
-          <p:nvSpPr>
-            <p:cNvPr id="12" name="Rectangle 11">
-              <a:extLst>
-                <a:ext uri="{FF2B5EF4-FFF2-40B4-BE49-F238E27FC236}">
-                  <a16:creationId xmlns:a16="http://schemas.microsoft.com/office/drawing/2014/main" id="{855B058E-9446-4CCD-AE87-FCB9822D919C}"/>
-                </a:ext>
-              </a:extLst>
-            </p:cNvPr>
-            <p:cNvSpPr/>
-            <p:nvPr/>
-          </p:nvSpPr>
-          <p:spPr>
-            <a:xfrm>
-              <a:off x="2823784" y="4001828"/>
-              <a:ext cx="1091235" cy="228925"/>
-            </a:xfrm>
-            <a:prstGeom prst="rect">
-              <a:avLst/>
-            </a:prstGeom>
-            <a:noFill/>
-            <a:ln w="28575">
-              <a:solidFill>
-                <a:schemeClr val="accent1"/>
-              </a:solidFill>
-            </a:ln>
-          </p:spPr>
-          <p:style>
-            <a:lnRef idx="2">
-              <a:schemeClr val="accent1">
-                <a:shade val="15000"/>
-              </a:schemeClr>
-            </a:lnRef>
-            <a:fillRef idx="1">
-              <a:schemeClr val="accent1"/>
-            </a:fillRef>
-            <a:effectRef idx="0">
-              <a:schemeClr val="accent1"/>
-            </a:effectRef>
-            <a:fontRef idx="minor">
-              <a:schemeClr val="lt1"/>
-            </a:fontRef>
-          </p:style>
-          <p:txBody>
-            <a:bodyPr rtlCol="0" anchor="ctr"/>
-            <a:lstStyle/>
-            <a:p>
-              <a:pPr algn="ctr"/>
-              <a:endParaRPr lang="en-US"/>
-            </a:p>
-          </p:txBody>
-        </p:sp>
-        <p:sp>
-          <p:nvSpPr>
-            <p:cNvPr id="13" name="Rectangle 12">
-              <a:extLst>
-                <a:ext uri="{FF2B5EF4-FFF2-40B4-BE49-F238E27FC236}">
-                  <a16:creationId xmlns:a16="http://schemas.microsoft.com/office/drawing/2014/main" id="{DB708F05-7868-ECDE-51ED-E69E1E145536}"/>
-                </a:ext>
-              </a:extLst>
-            </p:cNvPr>
-            <p:cNvSpPr/>
-            <p:nvPr/>
-          </p:nvSpPr>
-          <p:spPr>
-            <a:xfrm>
-              <a:off x="8231231" y="3601034"/>
-              <a:ext cx="780568" cy="228925"/>
-            </a:xfrm>
-            <a:prstGeom prst="rect">
-              <a:avLst/>
-            </a:prstGeom>
-            <a:noFill/>
-            <a:ln w="28575">
-              <a:solidFill>
-                <a:schemeClr val="accent1"/>
-              </a:solidFill>
-            </a:ln>
-          </p:spPr>
-          <p:style>
-            <a:lnRef idx="2">
-              <a:schemeClr val="accent1">
-                <a:shade val="15000"/>
-              </a:schemeClr>
-            </a:lnRef>
-            <a:fillRef idx="1">
-              <a:schemeClr val="accent1"/>
-            </a:fillRef>
-            <a:effectRef idx="0">
-              <a:schemeClr val="accent1"/>
-            </a:effectRef>
-            <a:fontRef idx="minor">
-              <a:schemeClr val="lt1"/>
-            </a:fontRef>
-          </p:style>
-          <p:txBody>
-            <a:bodyPr rtlCol="0" anchor="ctr"/>
-            <a:lstStyle/>
-            <a:p>
-              <a:pPr algn="ctr"/>
-              <a:endParaRPr lang="en-US"/>
-            </a:p>
-          </p:txBody>
-        </p:sp>
-        <p:sp>
-          <p:nvSpPr>
-            <p:cNvPr id="14" name="Rectangle 13">
-              <a:extLst>
-                <a:ext uri="{FF2B5EF4-FFF2-40B4-BE49-F238E27FC236}">
-                  <a16:creationId xmlns:a16="http://schemas.microsoft.com/office/drawing/2014/main" id="{88331CCF-ED3C-4DEB-F180-F3753126A50A}"/>
-                </a:ext>
-              </a:extLst>
-            </p:cNvPr>
-            <p:cNvSpPr/>
-            <p:nvPr/>
-          </p:nvSpPr>
-          <p:spPr>
-            <a:xfrm>
-              <a:off x="8264283" y="4477541"/>
-              <a:ext cx="747516" cy="209328"/>
-            </a:xfrm>
-            <a:prstGeom prst="rect">
-              <a:avLst/>
-            </a:prstGeom>
-            <a:noFill/>
-            <a:ln w="28575">
-              <a:solidFill>
-                <a:schemeClr val="accent1"/>
-              </a:solidFill>
-            </a:ln>
-          </p:spPr>
-          <p:style>
-            <a:lnRef idx="2">
-              <a:schemeClr val="accent1">
-                <a:shade val="15000"/>
-              </a:schemeClr>
-            </a:lnRef>
-            <a:fillRef idx="1">
-              <a:schemeClr val="accent1"/>
-            </a:fillRef>
-            <a:effectRef idx="0">
-              <a:schemeClr val="accent1"/>
-            </a:effectRef>
-            <a:fontRef idx="minor">
-              <a:schemeClr val="lt1"/>
-            </a:fontRef>
-          </p:style>
-          <p:txBody>
-            <a:bodyPr rtlCol="0" anchor="ctr"/>
-            <a:lstStyle/>
-            <a:p>
-              <a:pPr algn="ctr"/>
-              <a:endParaRPr lang="en-US"/>
-            </a:p>
-          </p:txBody>
-        </p:sp>
-        <p:sp>
-          <p:nvSpPr>
-            <p:cNvPr id="15" name="Rectangle 14">
-              <a:extLst>
-                <a:ext uri="{FF2B5EF4-FFF2-40B4-BE49-F238E27FC236}">
-                  <a16:creationId xmlns:a16="http://schemas.microsoft.com/office/drawing/2014/main" id="{6EAB0810-A409-F56F-6F9E-BD05C05287E4}"/>
-                </a:ext>
-              </a:extLst>
-            </p:cNvPr>
-            <p:cNvSpPr/>
-            <p:nvPr/>
-          </p:nvSpPr>
-          <p:spPr>
-            <a:xfrm>
-              <a:off x="8264283" y="5325518"/>
-              <a:ext cx="780568" cy="228925"/>
-            </a:xfrm>
-            <a:prstGeom prst="rect">
-              <a:avLst/>
-            </a:prstGeom>
-            <a:noFill/>
-            <a:ln w="28575">
-              <a:solidFill>
-                <a:schemeClr val="accent1"/>
-              </a:solidFill>
-            </a:ln>
-          </p:spPr>
-          <p:style>
-            <a:lnRef idx="2">
-              <a:schemeClr val="accent1">
-                <a:shade val="15000"/>
-              </a:schemeClr>
-            </a:lnRef>
-            <a:fillRef idx="1">
-              <a:schemeClr val="accent1"/>
-            </a:fillRef>
-            <a:effectRef idx="0">
-              <a:schemeClr val="accent1"/>
-            </a:effectRef>
-            <a:fontRef idx="minor">
-              <a:schemeClr val="lt1"/>
-            </a:fontRef>
-          </p:style>
-          <p:txBody>
-            <a:bodyPr rtlCol="0" anchor="ctr"/>
-            <a:lstStyle/>
-            <a:p>
-              <a:pPr algn="ctr"/>
-              <a:endParaRPr lang="en-US"/>
-            </a:p>
-          </p:txBody>
-        </p:sp>
-      </p:grpSp>
+            </a:solidFill>
+          </a:ln>
+        </p:spPr>
+        <p:style>
+          <a:lnRef idx="2">
+            <a:schemeClr val="accent1">
+              <a:shade val="15000"/>
+            </a:schemeClr>
+          </a:lnRef>
+          <a:fillRef idx="1">
+            <a:schemeClr val="accent1"/>
+          </a:fillRef>
+          <a:effectRef idx="0">
+            <a:schemeClr val="accent1"/>
+          </a:effectRef>
+          <a:fontRef idx="minor">
+            <a:schemeClr val="lt1"/>
+          </a:fontRef>
+        </p:style>
+        <p:txBody>
+          <a:bodyPr rtlCol="0" anchor="ctr"/>
+          <a:lstStyle/>
+          <a:p>
+            <a:pPr algn="ctr"/>
+            <a:endParaRPr lang="en-US"/>
+          </a:p>
+        </p:txBody>
+      </p:sp>
     </p:spTree>
     <p:extLst>
       <p:ext uri="{BB962C8B-B14F-4D97-AF65-F5344CB8AC3E}">
@@ -6230,7 +6493,7 @@
           <p:cNvPr id="2" name="Title 1">
             <a:extLst>
               <a:ext uri="{FF2B5EF4-FFF2-40B4-BE49-F238E27FC236}">
-                <a16:creationId xmlns:a16="http://schemas.microsoft.com/office/drawing/2014/main" id="{DF0EE5E3-915E-22F3-D7B3-8C195052E975}"/>
+                <a16:creationId xmlns:a16="http://schemas.microsoft.com/office/drawing/2014/main" id="{BE17C1A8-DBAE-F97D-1742-6D79714A93E6}"/>
               </a:ext>
             </a:extLst>
           </p:cNvPr>
@@ -6247,8 +6510,8 @@
           <a:lstStyle/>
           <a:p>
             <a:r>
-              <a:rPr lang="en-US"/>
-              <a:t>Examples</a:t>
+              <a:rPr lang="en-US" dirty="0"/>
+              <a:t>Assertions</a:t>
             </a:r>
           </a:p>
         </p:txBody>
@@ -6258,7 +6521,7 @@
           <p:cNvPr id="3" name="Content Placeholder 2">
             <a:extLst>
               <a:ext uri="{FF2B5EF4-FFF2-40B4-BE49-F238E27FC236}">
-                <a16:creationId xmlns:a16="http://schemas.microsoft.com/office/drawing/2014/main" id="{EB3792AD-2997-3536-D3D6-4685638A51E4}"/>
+                <a16:creationId xmlns:a16="http://schemas.microsoft.com/office/drawing/2014/main" id="{9E1766B1-4E96-71D1-9237-603EEC007D6A}"/>
               </a:ext>
             </a:extLst>
           </p:cNvPr>
@@ -6275,29 +6538,20 @@
           <a:lstStyle/>
           <a:p>
             <a:r>
-              <a:rPr lang="en-US"/>
-              <a:t>Debug the three samples on Blackboard</a:t>
-            </a:r>
-          </a:p>
-          <a:p>
-            <a:pPr lvl="1"/>
-            <a:r>
-              <a:rPr lang="en-US"/>
-              <a:t>Debug1.py</a:t>
-            </a:r>
-          </a:p>
-          <a:p>
-            <a:pPr lvl="1"/>
-            <a:r>
-              <a:rPr lang="en-US"/>
-              <a:t>Debug2.py</a:t>
-            </a:r>
-          </a:p>
-          <a:p>
-            <a:pPr lvl="1"/>
-            <a:r>
-              <a:rPr lang="en-US"/>
-              <a:t>Debug3.py</a:t>
+              <a:rPr lang="en-US" dirty="0"/>
+              <a:t>As we’ve seen, code that is “error free” isn’t necessarily “correct”. </a:t>
+            </a:r>
+          </a:p>
+          <a:p>
+            <a:r>
+              <a:rPr lang="en-US" dirty="0"/>
+              <a:t>It can be helpful to introduce tests in our code which explicitly check whether conditions are met- throwing an error if they are not. </a:t>
+            </a:r>
+          </a:p>
+          <a:p>
+            <a:r>
+              <a:rPr lang="en-US" dirty="0"/>
+              <a:t>In Python, we can do this with the assert keyword. </a:t>
             </a:r>
           </a:p>
         </p:txBody>
@@ -6305,7 +6559,7 @@
     </p:spTree>
     <p:extLst>
       <p:ext uri="{BB962C8B-B14F-4D97-AF65-F5344CB8AC3E}">
-        <p14:creationId xmlns:p14="http://schemas.microsoft.com/office/powerpoint/2010/main" val="3130747973"/>
+        <p14:creationId xmlns:p14="http://schemas.microsoft.com/office/powerpoint/2010/main" val="1206721504"/>
       </p:ext>
     </p:extLst>
   </p:cSld>
@@ -6388,75 +6642,75 @@
           <a:lstStyle/>
           <a:p>
             <a:r>
-              <a:rPr lang="en-GB" b="1"/>
+              <a:rPr lang="en-GB" b="1" dirty="0"/>
               <a:t>Understand</a:t>
             </a:r>
             <a:r>
-              <a:rPr lang="en-GB"/>
+              <a:rPr lang="en-GB" dirty="0"/>
               <a:t> that errors and bugs are a normal part of writing code</a:t>
             </a:r>
           </a:p>
           <a:p>
             <a:r>
-              <a:rPr lang="en-GB" b="1"/>
+              <a:rPr lang="en-GB" b="1" dirty="0"/>
               <a:t>Understand</a:t>
             </a:r>
             <a:r>
-              <a:rPr lang="en-GB"/>
+              <a:rPr lang="en-GB" dirty="0"/>
               <a:t> that </a:t>
             </a:r>
             <a:r>
-              <a:rPr lang="en-GB" i="1"/>
+              <a:rPr lang="en-GB" i="1" dirty="0"/>
               <a:t>tracebacks</a:t>
             </a:r>
             <a:r>
-              <a:rPr lang="en-GB"/>
+              <a:rPr lang="en-GB" dirty="0"/>
               <a:t> can help us to fix bugs and errors in our code</a:t>
             </a:r>
           </a:p>
           <a:p>
             <a:r>
-              <a:rPr lang="en-GB" b="1"/>
+              <a:rPr lang="en-GB" b="1" dirty="0"/>
               <a:t>Practice</a:t>
             </a:r>
             <a:r>
-              <a:rPr lang="en-GB" b="1" i="1"/>
+              <a:rPr lang="en-GB" b="1" i="1" dirty="0"/>
               <a:t> </a:t>
             </a:r>
             <a:r>
-              <a:rPr lang="en-GB"/>
+              <a:rPr lang="en-GB" dirty="0"/>
               <a:t>reading and understanding </a:t>
             </a:r>
             <a:r>
-              <a:rPr lang="en-GB" i="1"/>
+              <a:rPr lang="en-GB" i="1" dirty="0"/>
               <a:t>tracebacks</a:t>
             </a:r>
           </a:p>
           <a:p>
             <a:r>
-              <a:rPr lang="en-GB" b="1"/>
+              <a:rPr lang="en-GB" b="1" dirty="0"/>
               <a:t>Understand</a:t>
             </a:r>
             <a:r>
-              <a:rPr lang="en-GB"/>
+              <a:rPr lang="en-GB" dirty="0"/>
               <a:t> the meaning of some common Python </a:t>
             </a:r>
             <a:r>
-              <a:rPr lang="en-GB" i="1"/>
+              <a:rPr lang="en-GB" i="1" dirty="0"/>
               <a:t>Exceptions</a:t>
             </a:r>
-            <a:endParaRPr lang="en-GB"/>
-          </a:p>
-          <a:p>
-            <a:r>
-              <a:rPr lang="en-GB" b="1"/>
+            <a:endParaRPr lang="en-GB" dirty="0"/>
+          </a:p>
+          <a:p>
+            <a:r>
+              <a:rPr lang="en-GB" b="1" dirty="0"/>
               <a:t>Practice</a:t>
             </a:r>
             <a:r>
-              <a:rPr lang="en-GB"/>
+              <a:rPr lang="en-GB" dirty="0"/>
               <a:t> debugging some code.</a:t>
             </a:r>
-            <a:endParaRPr lang="en-GB" b="1"/>
+            <a:endParaRPr lang="en-GB" b="1" dirty="0"/>
           </a:p>
         </p:txBody>
       </p:sp>
@@ -7559,6 +7813,672 @@
 </p:sld>
 </file>
 
+<file path=ppt/slides/slide20.xml><?xml version="1.0" encoding="utf-8"?>
+<p:sld xmlns:a="http://schemas.openxmlformats.org/drawingml/2006/main" xmlns:r="http://schemas.openxmlformats.org/officeDocument/2006/relationships" xmlns:p="http://schemas.openxmlformats.org/presentationml/2006/main">
+  <p:cSld>
+    <p:spTree>
+      <p:nvGrpSpPr>
+        <p:cNvPr id="1" name=""/>
+        <p:cNvGrpSpPr/>
+        <p:nvPr/>
+      </p:nvGrpSpPr>
+      <p:grpSpPr>
+        <a:xfrm>
+          <a:off x="0" y="0"/>
+          <a:ext cx="0" cy="0"/>
+          <a:chOff x="0" y="0"/>
+          <a:chExt cx="0" cy="0"/>
+        </a:xfrm>
+      </p:grpSpPr>
+      <p:sp>
+        <p:nvSpPr>
+          <p:cNvPr id="2" name="Title 1">
+            <a:extLst>
+              <a:ext uri="{FF2B5EF4-FFF2-40B4-BE49-F238E27FC236}">
+                <a16:creationId xmlns:a16="http://schemas.microsoft.com/office/drawing/2014/main" id="{3DD28F13-5CF8-AEF2-E10C-E3187051FBDB}"/>
+              </a:ext>
+            </a:extLst>
+          </p:cNvPr>
+          <p:cNvSpPr>
+            <a:spLocks noGrp="1"/>
+          </p:cNvSpPr>
+          <p:nvPr>
+            <p:ph type="title"/>
+          </p:nvPr>
+        </p:nvSpPr>
+        <p:spPr/>
+        <p:txBody>
+          <a:bodyPr/>
+          <a:lstStyle/>
+          <a:p>
+            <a:r>
+              <a:rPr lang="en-US"/>
+              <a:t>The Syntax of assert</a:t>
+            </a:r>
+          </a:p>
+        </p:txBody>
+      </p:sp>
+      <p:pic>
+        <p:nvPicPr>
+          <p:cNvPr id="4" name="Content Placeholder 3" descr="A screenshot of a computer&#10;&#10;Description automatically generated">
+            <a:extLst>
+              <a:ext uri="{FF2B5EF4-FFF2-40B4-BE49-F238E27FC236}">
+                <a16:creationId xmlns:a16="http://schemas.microsoft.com/office/drawing/2014/main" id="{9179FF44-72AB-21A7-6A8D-51D04FEEB696}"/>
+              </a:ext>
+            </a:extLst>
+          </p:cNvPr>
+          <p:cNvPicPr>
+            <a:picLocks noGrp="1" noChangeAspect="1"/>
+          </p:cNvPicPr>
+          <p:nvPr>
+            <p:ph idx="1"/>
+          </p:nvPr>
+        </p:nvPicPr>
+        <p:blipFill>
+          <a:blip r:embed="rId2"/>
+          <a:stretch>
+            <a:fillRect/>
+          </a:stretch>
+        </p:blipFill>
+        <p:spPr>
+          <a:xfrm>
+            <a:off x="1237441" y="1547349"/>
+            <a:ext cx="9717117" cy="2176191"/>
+          </a:xfrm>
+        </p:spPr>
+      </p:pic>
+      <p:pic>
+        <p:nvPicPr>
+          <p:cNvPr id="3" name="Picture 2" descr="A black background with white text&#10;&#10;Description automatically generated">
+            <a:extLst>
+              <a:ext uri="{FF2B5EF4-FFF2-40B4-BE49-F238E27FC236}">
+                <a16:creationId xmlns:a16="http://schemas.microsoft.com/office/drawing/2014/main" id="{2C903E62-6DF0-CF38-FE88-A8B3AC180089}"/>
+              </a:ext>
+            </a:extLst>
+          </p:cNvPr>
+          <p:cNvPicPr>
+            <a:picLocks noChangeAspect="1"/>
+          </p:cNvPicPr>
+          <p:nvPr/>
+        </p:nvPicPr>
+        <p:blipFill>
+          <a:blip r:embed="rId3"/>
+          <a:stretch>
+            <a:fillRect/>
+          </a:stretch>
+        </p:blipFill>
+        <p:spPr>
+          <a:xfrm>
+            <a:off x="1237441" y="4173567"/>
+            <a:ext cx="9720532" cy="1236812"/>
+          </a:xfrm>
+          <a:prstGeom prst="rect">
+            <a:avLst/>
+          </a:prstGeom>
+        </p:spPr>
+      </p:pic>
+    </p:spTree>
+    <p:extLst>
+      <p:ext uri="{BB962C8B-B14F-4D97-AF65-F5344CB8AC3E}">
+        <p14:creationId xmlns:p14="http://schemas.microsoft.com/office/powerpoint/2010/main" val="3779832221"/>
+      </p:ext>
+    </p:extLst>
+  </p:cSld>
+  <p:clrMapOvr>
+    <a:masterClrMapping/>
+  </p:clrMapOvr>
+</p:sld>
+</file>
+
+<file path=ppt/slides/slide21.xml><?xml version="1.0" encoding="utf-8"?>
+<p:sld xmlns:a="http://schemas.openxmlformats.org/drawingml/2006/main" xmlns:r="http://schemas.openxmlformats.org/officeDocument/2006/relationships" xmlns:p="http://schemas.openxmlformats.org/presentationml/2006/main">
+  <p:cSld>
+    <p:spTree>
+      <p:nvGrpSpPr>
+        <p:cNvPr id="1" name="">
+          <a:extLst>
+            <a:ext uri="{FF2B5EF4-FFF2-40B4-BE49-F238E27FC236}">
+              <a16:creationId xmlns:a16="http://schemas.microsoft.com/office/drawing/2014/main" id="{3BA21815-8BAF-70BA-D012-F15F535A7EFA}"/>
+            </a:ext>
+          </a:extLst>
+        </p:cNvPr>
+        <p:cNvGrpSpPr/>
+        <p:nvPr/>
+      </p:nvGrpSpPr>
+      <p:grpSpPr>
+        <a:xfrm>
+          <a:off x="0" y="0"/>
+          <a:ext cx="0" cy="0"/>
+          <a:chOff x="0" y="0"/>
+          <a:chExt cx="0" cy="0"/>
+        </a:xfrm>
+      </p:grpSpPr>
+      <p:sp>
+        <p:nvSpPr>
+          <p:cNvPr id="2" name="Title 1">
+            <a:extLst>
+              <a:ext uri="{FF2B5EF4-FFF2-40B4-BE49-F238E27FC236}">
+                <a16:creationId xmlns:a16="http://schemas.microsoft.com/office/drawing/2014/main" id="{0CCCB31E-7463-4B3E-CBA4-E8CFF2D7E0F6}"/>
+              </a:ext>
+            </a:extLst>
+          </p:cNvPr>
+          <p:cNvSpPr>
+            <a:spLocks noGrp="1"/>
+          </p:cNvSpPr>
+          <p:nvPr>
+            <p:ph type="title"/>
+          </p:nvPr>
+        </p:nvSpPr>
+        <p:spPr/>
+        <p:txBody>
+          <a:bodyPr/>
+          <a:lstStyle/>
+          <a:p>
+            <a:r>
+              <a:rPr lang="en-US" dirty="0"/>
+              <a:t>Assert Example</a:t>
+            </a:r>
+          </a:p>
+        </p:txBody>
+      </p:sp>
+      <p:pic>
+        <p:nvPicPr>
+          <p:cNvPr id="8" name="Picture 7">
+            <a:extLst>
+              <a:ext uri="{FF2B5EF4-FFF2-40B4-BE49-F238E27FC236}">
+                <a16:creationId xmlns:a16="http://schemas.microsoft.com/office/drawing/2014/main" id="{853CAB5E-DE28-BF09-0B0E-D88947A5960C}"/>
+              </a:ext>
+            </a:extLst>
+          </p:cNvPr>
+          <p:cNvPicPr>
+            <a:picLocks noChangeAspect="1"/>
+          </p:cNvPicPr>
+          <p:nvPr/>
+        </p:nvPicPr>
+        <p:blipFill>
+          <a:blip r:embed="rId2">
+            <a:extLst>
+              <a:ext uri="{28A0092B-C50C-407E-A947-70E740481C1C}">
+                <a14:useLocalDpi xmlns:a14="http://schemas.microsoft.com/office/drawing/2010/main" val="0"/>
+              </a:ext>
+            </a:extLst>
+          </a:blip>
+          <a:stretch>
+            <a:fillRect/>
+          </a:stretch>
+        </p:blipFill>
+        <p:spPr>
+          <a:xfrm>
+            <a:off x="665843" y="3632314"/>
+            <a:ext cx="10860314" cy="1325563"/>
+          </a:xfrm>
+          <a:prstGeom prst="rect">
+            <a:avLst/>
+          </a:prstGeom>
+        </p:spPr>
+      </p:pic>
+      <p:pic>
+        <p:nvPicPr>
+          <p:cNvPr id="10" name="Picture 9" descr="A blue and green text&#10;&#10;AI-generated content may be incorrect.">
+            <a:extLst>
+              <a:ext uri="{FF2B5EF4-FFF2-40B4-BE49-F238E27FC236}">
+                <a16:creationId xmlns:a16="http://schemas.microsoft.com/office/drawing/2014/main" id="{A33A277B-5AE3-F7CB-53DE-740853C4EB53}"/>
+              </a:ext>
+            </a:extLst>
+          </p:cNvPr>
+          <p:cNvPicPr>
+            <a:picLocks noChangeAspect="1"/>
+          </p:cNvPicPr>
+          <p:nvPr/>
+        </p:nvPicPr>
+        <p:blipFill>
+          <a:blip r:embed="rId3">
+            <a:extLst>
+              <a:ext uri="{28A0092B-C50C-407E-A947-70E740481C1C}">
+                <a14:useLocalDpi xmlns:a14="http://schemas.microsoft.com/office/drawing/2010/main" val="0"/>
+              </a:ext>
+            </a:extLst>
+          </a:blip>
+          <a:stretch>
+            <a:fillRect/>
+          </a:stretch>
+        </p:blipFill>
+        <p:spPr>
+          <a:xfrm>
+            <a:off x="665843" y="1900124"/>
+            <a:ext cx="9644614" cy="1325563"/>
+          </a:xfrm>
+          <a:prstGeom prst="rect">
+            <a:avLst/>
+          </a:prstGeom>
+        </p:spPr>
+      </p:pic>
+    </p:spTree>
+    <p:extLst>
+      <p:ext uri="{BB962C8B-B14F-4D97-AF65-F5344CB8AC3E}">
+        <p14:creationId xmlns:p14="http://schemas.microsoft.com/office/powerpoint/2010/main" val="666266812"/>
+      </p:ext>
+    </p:extLst>
+  </p:cSld>
+  <p:clrMapOvr>
+    <a:masterClrMapping/>
+  </p:clrMapOvr>
+</p:sld>
+</file>
+
+<file path=ppt/slides/slide22.xml><?xml version="1.0" encoding="utf-8"?>
+<p:sld xmlns:a="http://schemas.openxmlformats.org/drawingml/2006/main" xmlns:r="http://schemas.openxmlformats.org/officeDocument/2006/relationships" xmlns:p="http://schemas.openxmlformats.org/presentationml/2006/main">
+  <p:cSld>
+    <p:spTree>
+      <p:nvGrpSpPr>
+        <p:cNvPr id="1" name="">
+          <a:extLst>
+            <a:ext uri="{FF2B5EF4-FFF2-40B4-BE49-F238E27FC236}">
+              <a16:creationId xmlns:a16="http://schemas.microsoft.com/office/drawing/2014/main" id="{A5E00E71-5F86-109E-27C6-2BEBD46C7EDA}"/>
+            </a:ext>
+          </a:extLst>
+        </p:cNvPr>
+        <p:cNvGrpSpPr/>
+        <p:nvPr/>
+      </p:nvGrpSpPr>
+      <p:grpSpPr>
+        <a:xfrm>
+          <a:off x="0" y="0"/>
+          <a:ext cx="0" cy="0"/>
+          <a:chOff x="0" y="0"/>
+          <a:chExt cx="0" cy="0"/>
+        </a:xfrm>
+      </p:grpSpPr>
+      <p:sp>
+        <p:nvSpPr>
+          <p:cNvPr id="2" name="Title 1">
+            <a:extLst>
+              <a:ext uri="{FF2B5EF4-FFF2-40B4-BE49-F238E27FC236}">
+                <a16:creationId xmlns:a16="http://schemas.microsoft.com/office/drawing/2014/main" id="{1348ECDF-4894-5457-8387-1413EA005A0E}"/>
+              </a:ext>
+            </a:extLst>
+          </p:cNvPr>
+          <p:cNvSpPr>
+            <a:spLocks noGrp="1"/>
+          </p:cNvSpPr>
+          <p:nvPr>
+            <p:ph type="title"/>
+          </p:nvPr>
+        </p:nvSpPr>
+        <p:spPr/>
+        <p:txBody>
+          <a:bodyPr/>
+          <a:lstStyle/>
+          <a:p>
+            <a:r>
+              <a:rPr lang="en-US" dirty="0"/>
+              <a:t>Assert Example</a:t>
+            </a:r>
+          </a:p>
+        </p:txBody>
+      </p:sp>
+      <p:pic>
+        <p:nvPicPr>
+          <p:cNvPr id="8" name="Picture 7">
+            <a:extLst>
+              <a:ext uri="{FF2B5EF4-FFF2-40B4-BE49-F238E27FC236}">
+                <a16:creationId xmlns:a16="http://schemas.microsoft.com/office/drawing/2014/main" id="{D1732F85-C57B-EB2F-0A83-0278BBB334AB}"/>
+              </a:ext>
+            </a:extLst>
+          </p:cNvPr>
+          <p:cNvPicPr>
+            <a:picLocks noChangeAspect="1"/>
+          </p:cNvPicPr>
+          <p:nvPr/>
+        </p:nvPicPr>
+        <p:blipFill>
+          <a:blip r:embed="rId2">
+            <a:extLst>
+              <a:ext uri="{28A0092B-C50C-407E-A947-70E740481C1C}">
+                <a14:useLocalDpi xmlns:a14="http://schemas.microsoft.com/office/drawing/2010/main" val="0"/>
+              </a:ext>
+            </a:extLst>
+          </a:blip>
+          <a:stretch>
+            <a:fillRect/>
+          </a:stretch>
+        </p:blipFill>
+        <p:spPr>
+          <a:xfrm>
+            <a:off x="665843" y="3632314"/>
+            <a:ext cx="10860314" cy="1325563"/>
+          </a:xfrm>
+          <a:prstGeom prst="rect">
+            <a:avLst/>
+          </a:prstGeom>
+        </p:spPr>
+      </p:pic>
+      <p:pic>
+        <p:nvPicPr>
+          <p:cNvPr id="10" name="Picture 9" descr="A blue and green text&#10;&#10;AI-generated content may be incorrect.">
+            <a:extLst>
+              <a:ext uri="{FF2B5EF4-FFF2-40B4-BE49-F238E27FC236}">
+                <a16:creationId xmlns:a16="http://schemas.microsoft.com/office/drawing/2014/main" id="{939B82AC-7725-5E65-8781-FB60C32461AC}"/>
+              </a:ext>
+            </a:extLst>
+          </p:cNvPr>
+          <p:cNvPicPr>
+            <a:picLocks noChangeAspect="1"/>
+          </p:cNvPicPr>
+          <p:nvPr/>
+        </p:nvPicPr>
+        <p:blipFill>
+          <a:blip r:embed="rId3">
+            <a:extLst>
+              <a:ext uri="{28A0092B-C50C-407E-A947-70E740481C1C}">
+                <a14:useLocalDpi xmlns:a14="http://schemas.microsoft.com/office/drawing/2010/main" val="0"/>
+              </a:ext>
+            </a:extLst>
+          </a:blip>
+          <a:stretch>
+            <a:fillRect/>
+          </a:stretch>
+        </p:blipFill>
+        <p:spPr>
+          <a:xfrm>
+            <a:off x="665843" y="1900124"/>
+            <a:ext cx="9644614" cy="1325563"/>
+          </a:xfrm>
+          <a:prstGeom prst="rect">
+            <a:avLst/>
+          </a:prstGeom>
+        </p:spPr>
+      </p:pic>
+      <p:sp>
+        <p:nvSpPr>
+          <p:cNvPr id="3" name="Rectangle 2">
+            <a:extLst>
+              <a:ext uri="{FF2B5EF4-FFF2-40B4-BE49-F238E27FC236}">
+                <a16:creationId xmlns:a16="http://schemas.microsoft.com/office/drawing/2014/main" id="{05F190CA-FD7E-2DF7-7AFD-3D67B726BA4B}"/>
+              </a:ext>
+            </a:extLst>
+          </p:cNvPr>
+          <p:cNvSpPr/>
+          <p:nvPr/>
+        </p:nvSpPr>
+        <p:spPr>
+          <a:xfrm>
+            <a:off x="665842" y="3632314"/>
+            <a:ext cx="10860313" cy="983229"/>
+          </a:xfrm>
+          <a:prstGeom prst="rect">
+            <a:avLst/>
+          </a:prstGeom>
+          <a:noFill/>
+          <a:ln w="28575">
+            <a:solidFill>
+              <a:srgbClr val="FF0000"/>
+            </a:solidFill>
+          </a:ln>
+        </p:spPr>
+        <p:style>
+          <a:lnRef idx="2">
+            <a:schemeClr val="accent1">
+              <a:shade val="15000"/>
+            </a:schemeClr>
+          </a:lnRef>
+          <a:fillRef idx="1">
+            <a:schemeClr val="accent1"/>
+          </a:fillRef>
+          <a:effectRef idx="0">
+            <a:schemeClr val="accent1"/>
+          </a:effectRef>
+          <a:fontRef idx="minor">
+            <a:schemeClr val="lt1"/>
+          </a:fontRef>
+        </p:style>
+        <p:txBody>
+          <a:bodyPr rtlCol="0" anchor="ctr"/>
+          <a:lstStyle/>
+          <a:p>
+            <a:pPr algn="ctr"/>
+            <a:endParaRPr lang="en-US"/>
+          </a:p>
+        </p:txBody>
+      </p:sp>
+      <p:sp>
+        <p:nvSpPr>
+          <p:cNvPr id="4" name="Rectangle 3">
+            <a:extLst>
+              <a:ext uri="{FF2B5EF4-FFF2-40B4-BE49-F238E27FC236}">
+                <a16:creationId xmlns:a16="http://schemas.microsoft.com/office/drawing/2014/main" id="{B629B7DF-73D7-128F-739B-62B963B115CF}"/>
+              </a:ext>
+            </a:extLst>
+          </p:cNvPr>
+          <p:cNvSpPr/>
+          <p:nvPr/>
+        </p:nvSpPr>
+        <p:spPr>
+          <a:xfrm>
+            <a:off x="6489516" y="4009465"/>
+            <a:ext cx="780568" cy="228925"/>
+          </a:xfrm>
+          <a:prstGeom prst="rect">
+            <a:avLst/>
+          </a:prstGeom>
+          <a:noFill/>
+          <a:ln w="28575">
+            <a:solidFill>
+              <a:schemeClr val="accent1"/>
+            </a:solidFill>
+          </a:ln>
+        </p:spPr>
+        <p:style>
+          <a:lnRef idx="2">
+            <a:schemeClr val="accent1">
+              <a:shade val="15000"/>
+            </a:schemeClr>
+          </a:lnRef>
+          <a:fillRef idx="1">
+            <a:schemeClr val="accent1"/>
+          </a:fillRef>
+          <a:effectRef idx="0">
+            <a:schemeClr val="accent1"/>
+          </a:effectRef>
+          <a:fontRef idx="minor">
+            <a:schemeClr val="lt1"/>
+          </a:fontRef>
+        </p:style>
+        <p:txBody>
+          <a:bodyPr rtlCol="0" anchor="ctr"/>
+          <a:lstStyle/>
+          <a:p>
+            <a:pPr algn="ctr"/>
+            <a:endParaRPr lang="en-US"/>
+          </a:p>
+        </p:txBody>
+      </p:sp>
+      <p:sp>
+        <p:nvSpPr>
+          <p:cNvPr id="5" name="Rectangle 4">
+            <a:extLst>
+              <a:ext uri="{FF2B5EF4-FFF2-40B4-BE49-F238E27FC236}">
+                <a16:creationId xmlns:a16="http://schemas.microsoft.com/office/drawing/2014/main" id="{DFCC9993-39B6-9B62-FD8B-A46990F56060}"/>
+              </a:ext>
+            </a:extLst>
+          </p:cNvPr>
+          <p:cNvSpPr/>
+          <p:nvPr/>
+        </p:nvSpPr>
+        <p:spPr>
+          <a:xfrm>
+            <a:off x="665839" y="4368800"/>
+            <a:ext cx="1293589" cy="246743"/>
+          </a:xfrm>
+          <a:prstGeom prst="rect">
+            <a:avLst/>
+          </a:prstGeom>
+          <a:noFill/>
+          <a:ln w="28575">
+            <a:solidFill>
+              <a:schemeClr val="accent1"/>
+            </a:solidFill>
+          </a:ln>
+        </p:spPr>
+        <p:style>
+          <a:lnRef idx="2">
+            <a:schemeClr val="accent1">
+              <a:shade val="15000"/>
+            </a:schemeClr>
+          </a:lnRef>
+          <a:fillRef idx="1">
+            <a:schemeClr val="accent1"/>
+          </a:fillRef>
+          <a:effectRef idx="0">
+            <a:schemeClr val="accent1"/>
+          </a:effectRef>
+          <a:fontRef idx="minor">
+            <a:schemeClr val="lt1"/>
+          </a:fontRef>
+        </p:style>
+        <p:txBody>
+          <a:bodyPr rtlCol="0" anchor="ctr"/>
+          <a:lstStyle/>
+          <a:p>
+            <a:pPr algn="ctr"/>
+            <a:endParaRPr lang="en-US"/>
+          </a:p>
+        </p:txBody>
+      </p:sp>
+    </p:spTree>
+    <p:extLst>
+      <p:ext uri="{BB962C8B-B14F-4D97-AF65-F5344CB8AC3E}">
+        <p14:creationId xmlns:p14="http://schemas.microsoft.com/office/powerpoint/2010/main" val="3705673433"/>
+      </p:ext>
+    </p:extLst>
+  </p:cSld>
+  <p:clrMapOvr>
+    <a:masterClrMapping/>
+  </p:clrMapOvr>
+</p:sld>
+</file>
+
+<file path=ppt/slides/slide23.xml><?xml version="1.0" encoding="utf-8"?>
+<p:sld xmlns:a="http://schemas.openxmlformats.org/drawingml/2006/main" xmlns:r="http://schemas.openxmlformats.org/officeDocument/2006/relationships" xmlns:p="http://schemas.openxmlformats.org/presentationml/2006/main">
+  <p:cSld>
+    <p:spTree>
+      <p:nvGrpSpPr>
+        <p:cNvPr id="1" name=""/>
+        <p:cNvGrpSpPr/>
+        <p:nvPr/>
+      </p:nvGrpSpPr>
+      <p:grpSpPr>
+        <a:xfrm>
+          <a:off x="0" y="0"/>
+          <a:ext cx="0" cy="0"/>
+          <a:chOff x="0" y="0"/>
+          <a:chExt cx="0" cy="0"/>
+        </a:xfrm>
+      </p:grpSpPr>
+      <p:sp>
+        <p:nvSpPr>
+          <p:cNvPr id="2" name="Title 1">
+            <a:extLst>
+              <a:ext uri="{FF2B5EF4-FFF2-40B4-BE49-F238E27FC236}">
+                <a16:creationId xmlns:a16="http://schemas.microsoft.com/office/drawing/2014/main" id="{DF0EE5E3-915E-22F3-D7B3-8C195052E975}"/>
+              </a:ext>
+            </a:extLst>
+          </p:cNvPr>
+          <p:cNvSpPr>
+            <a:spLocks noGrp="1"/>
+          </p:cNvSpPr>
+          <p:nvPr>
+            <p:ph type="title"/>
+          </p:nvPr>
+        </p:nvSpPr>
+        <p:spPr/>
+        <p:txBody>
+          <a:bodyPr/>
+          <a:lstStyle/>
+          <a:p>
+            <a:r>
+              <a:rPr lang="en-US"/>
+              <a:t>Examples</a:t>
+            </a:r>
+          </a:p>
+        </p:txBody>
+      </p:sp>
+      <p:sp>
+        <p:nvSpPr>
+          <p:cNvPr id="3" name="Content Placeholder 2">
+            <a:extLst>
+              <a:ext uri="{FF2B5EF4-FFF2-40B4-BE49-F238E27FC236}">
+                <a16:creationId xmlns:a16="http://schemas.microsoft.com/office/drawing/2014/main" id="{EB3792AD-2997-3536-D3D6-4685638A51E4}"/>
+              </a:ext>
+            </a:extLst>
+          </p:cNvPr>
+          <p:cNvSpPr>
+            <a:spLocks noGrp="1"/>
+          </p:cNvSpPr>
+          <p:nvPr>
+            <p:ph idx="1"/>
+          </p:nvPr>
+        </p:nvSpPr>
+        <p:spPr/>
+        <p:txBody>
+          <a:bodyPr/>
+          <a:lstStyle/>
+          <a:p>
+            <a:r>
+              <a:rPr lang="en-US" dirty="0"/>
+              <a:t>Debug the two samples on Blackboard</a:t>
+            </a:r>
+          </a:p>
+          <a:p>
+            <a:pPr lvl="1"/>
+            <a:r>
+              <a:rPr lang="en-US" dirty="0"/>
+              <a:t>Debug1.py</a:t>
+            </a:r>
+          </a:p>
+          <a:p>
+            <a:pPr lvl="1"/>
+            <a:r>
+              <a:rPr lang="en-US" dirty="0"/>
+              <a:t>Debug2.py</a:t>
+            </a:r>
+          </a:p>
+          <a:p>
+            <a:pPr lvl="1"/>
+            <a:endParaRPr lang="en-US" dirty="0"/>
+          </a:p>
+          <a:p>
+            <a:pPr marL="0" indent="0">
+              <a:buNone/>
+            </a:pPr>
+            <a:r>
+              <a:rPr lang="en-US" dirty="0"/>
+              <a:t>Share the bugs you found on </a:t>
+            </a:r>
+            <a:r>
+              <a:rPr lang="en-US" dirty="0" err="1"/>
+              <a:t>menti.com</a:t>
+            </a:r>
+            <a:r>
+              <a:rPr lang="en-US" dirty="0"/>
+              <a:t>, code: 77087587</a:t>
+            </a:r>
+          </a:p>
+        </p:txBody>
+      </p:sp>
+    </p:spTree>
+    <p:extLst>
+      <p:ext uri="{BB962C8B-B14F-4D97-AF65-F5344CB8AC3E}">
+        <p14:creationId xmlns:p14="http://schemas.microsoft.com/office/powerpoint/2010/main" val="3130747973"/>
+      </p:ext>
+    </p:extLst>
+  </p:cSld>
+  <p:clrMapOvr>
+    <a:masterClrMapping/>
+  </p:clrMapOvr>
+</p:sld>
+</file>
+
 <file path=ppt/slides/slide3.xml><?xml version="1.0" encoding="utf-8"?>
 <p:sld xmlns:a="http://schemas.openxmlformats.org/drawingml/2006/main" xmlns:r="http://schemas.openxmlformats.org/officeDocument/2006/relationships" xmlns:p="http://schemas.openxmlformats.org/presentationml/2006/main">
   <p:cSld>

</xml_diff>